<commit_message>
Added news article about trademark registration.
</commit_message>
<xml_diff>
--- a/static/media/news/2023-09-11.pptx
+++ b/static/media/news/2023-09-11.pptx
@@ -5,23 +5,24 @@
     <p:sldMasterId id="2147483648" r:id="rId1"/>
   </p:sldMasterIdLst>
   <p:sldIdLst>
-    <p:sldId id="257" r:id="rId2"/>
+    <p:sldId id="259" r:id="rId2"/>
     <p:sldId id="258" r:id="rId3"/>
+    <p:sldId id="257" r:id="rId4"/>
   </p:sldIdLst>
   <p:sldSz cx="12192000" cy="6858000"/>
   <p:notesSz cx="6858000" cy="9144000"/>
   <p:embeddedFontLst>
     <p:embeddedFont>
       <p:font typeface="Calibri Light" panose="020F0302020204030204" pitchFamily="34" charset="0"/>
-      <p:regular r:id="rId4"/>
-      <p:italic r:id="rId5"/>
+      <p:regular r:id="rId5"/>
+      <p:italic r:id="rId6"/>
     </p:embeddedFont>
     <p:embeddedFont>
       <p:font typeface="Calibri" panose="020F0502020204030204" pitchFamily="34" charset="0"/>
-      <p:regular r:id="rId6"/>
-      <p:bold r:id="rId7"/>
-      <p:italic r:id="rId8"/>
-      <p:boldItalic r:id="rId9"/>
+      <p:regular r:id="rId7"/>
+      <p:bold r:id="rId8"/>
+      <p:italic r:id="rId9"/>
+      <p:boldItalic r:id="rId10"/>
     </p:embeddedFont>
   </p:embeddedFontLst>
   <p:defaultTextStyle>
@@ -258,7 +259,7 @@
           <a:p>
             <a:fld id="{076171DA-D5DD-486B-A5F5-158E752AA603}" type="datetimeFigureOut">
               <a:rPr lang="en-US" smtClean="0"/>
-              <a:t>9/13/2023</a:t>
+              <a:t>9/14/2023</a:t>
             </a:fld>
             <a:endParaRPr lang="en-US"/>
           </a:p>
@@ -428,7 +429,7 @@
           <a:p>
             <a:fld id="{076171DA-D5DD-486B-A5F5-158E752AA603}" type="datetimeFigureOut">
               <a:rPr lang="en-US" smtClean="0"/>
-              <a:t>9/13/2023</a:t>
+              <a:t>9/14/2023</a:t>
             </a:fld>
             <a:endParaRPr lang="en-US"/>
           </a:p>
@@ -608,7 +609,7 @@
           <a:p>
             <a:fld id="{076171DA-D5DD-486B-A5F5-158E752AA603}" type="datetimeFigureOut">
               <a:rPr lang="en-US" smtClean="0"/>
-              <a:t>9/13/2023</a:t>
+              <a:t>9/14/2023</a:t>
             </a:fld>
             <a:endParaRPr lang="en-US"/>
           </a:p>
@@ -778,7 +779,7 @@
           <a:p>
             <a:fld id="{076171DA-D5DD-486B-A5F5-158E752AA603}" type="datetimeFigureOut">
               <a:rPr lang="en-US" smtClean="0"/>
-              <a:t>9/13/2023</a:t>
+              <a:t>9/14/2023</a:t>
             </a:fld>
             <a:endParaRPr lang="en-US"/>
           </a:p>
@@ -1024,7 +1025,7 @@
           <a:p>
             <a:fld id="{076171DA-D5DD-486B-A5F5-158E752AA603}" type="datetimeFigureOut">
               <a:rPr lang="en-US" smtClean="0"/>
-              <a:t>9/13/2023</a:t>
+              <a:t>9/14/2023</a:t>
             </a:fld>
             <a:endParaRPr lang="en-US"/>
           </a:p>
@@ -1256,7 +1257,7 @@
           <a:p>
             <a:fld id="{076171DA-D5DD-486B-A5F5-158E752AA603}" type="datetimeFigureOut">
               <a:rPr lang="en-US" smtClean="0"/>
-              <a:t>9/13/2023</a:t>
+              <a:t>9/14/2023</a:t>
             </a:fld>
             <a:endParaRPr lang="en-US"/>
           </a:p>
@@ -1623,7 +1624,7 @@
           <a:p>
             <a:fld id="{076171DA-D5DD-486B-A5F5-158E752AA603}" type="datetimeFigureOut">
               <a:rPr lang="en-US" smtClean="0"/>
-              <a:t>9/13/2023</a:t>
+              <a:t>9/14/2023</a:t>
             </a:fld>
             <a:endParaRPr lang="en-US"/>
           </a:p>
@@ -1741,7 +1742,7 @@
           <a:p>
             <a:fld id="{076171DA-D5DD-486B-A5F5-158E752AA603}" type="datetimeFigureOut">
               <a:rPr lang="en-US" smtClean="0"/>
-              <a:t>9/13/2023</a:t>
+              <a:t>9/14/2023</a:t>
             </a:fld>
             <a:endParaRPr lang="en-US"/>
           </a:p>
@@ -1836,7 +1837,7 @@
           <a:p>
             <a:fld id="{076171DA-D5DD-486B-A5F5-158E752AA603}" type="datetimeFigureOut">
               <a:rPr lang="en-US" smtClean="0"/>
-              <a:t>9/13/2023</a:t>
+              <a:t>9/14/2023</a:t>
             </a:fld>
             <a:endParaRPr lang="en-US"/>
           </a:p>
@@ -2113,7 +2114,7 @@
           <a:p>
             <a:fld id="{076171DA-D5DD-486B-A5F5-158E752AA603}" type="datetimeFigureOut">
               <a:rPr lang="en-US" smtClean="0"/>
-              <a:t>9/13/2023</a:t>
+              <a:t>9/14/2023</a:t>
             </a:fld>
             <a:endParaRPr lang="en-US"/>
           </a:p>
@@ -2366,7 +2367,7 @@
           <a:p>
             <a:fld id="{076171DA-D5DD-486B-A5F5-158E752AA603}" type="datetimeFigureOut">
               <a:rPr lang="en-US" smtClean="0"/>
-              <a:t>9/13/2023</a:t>
+              <a:t>9/14/2023</a:t>
             </a:fld>
             <a:endParaRPr lang="en-US"/>
           </a:p>
@@ -2579,7 +2580,7 @@
           <a:p>
             <a:fld id="{076171DA-D5DD-486B-A5F5-158E752AA603}" type="datetimeFigureOut">
               <a:rPr lang="en-US" smtClean="0"/>
-              <a:t>9/13/2023</a:t>
+              <a:t>9/14/2023</a:t>
             </a:fld>
             <a:endParaRPr lang="en-US"/>
           </a:p>
@@ -2984,6 +2985,1265 @@
           <a:chExt cx="0" cy="0"/>
         </a:xfrm>
       </p:grpSpPr>
+      <p:sp>
+        <p:nvSpPr>
+          <p:cNvPr id="6" name="TextBox 5"/>
+          <p:cNvSpPr txBox="1"/>
+          <p:nvPr/>
+        </p:nvSpPr>
+        <p:spPr>
+          <a:xfrm>
+            <a:off x="3605249" y="4184799"/>
+            <a:ext cx="4677114" cy="276999"/>
+          </a:xfrm>
+          <a:prstGeom prst="rect">
+            <a:avLst/>
+          </a:prstGeom>
+          <a:noFill/>
+        </p:spPr>
+        <p:txBody>
+          <a:bodyPr wrap="none" lIns="0" tIns="0" rIns="0" bIns="0" rtlCol="0">
+            <a:spAutoFit/>
+          </a:bodyPr>
+          <a:lstStyle/>
+          <a:p>
+            <a:pPr marL="0" marR="0" lvl="0" indent="0" algn="l" defTabSz="914400" rtl="0" eaLnBrk="1" fontAlgn="auto" latinLnBrk="0" hangingPunct="1">
+              <a:lnSpc>
+                <a:spcPct val="100000"/>
+              </a:lnSpc>
+              <a:spcBef>
+                <a:spcPts val="0"/>
+              </a:spcBef>
+              <a:spcAft>
+                <a:spcPts val="0"/>
+              </a:spcAft>
+              <a:buClrTx/>
+              <a:buSzTx/>
+              <a:buFontTx/>
+              <a:buNone/>
+              <a:tabLst/>
+              <a:defRPr/>
+            </a:pPr>
+            <a:r>
+              <a:rPr kumimoji="0" lang="en-US" sz="1800" b="0" i="0" u="none" strike="noStrike" kern="1200" cap="none" spc="0" normalizeH="0" baseline="0" noProof="0" dirty="0" smtClean="0">
+                <a:ln>
+                  <a:noFill/>
+                </a:ln>
+                <a:solidFill>
+                  <a:prstClr val="black"/>
+                </a:solidFill>
+                <a:effectLst/>
+                <a:uLnTx/>
+                <a:uFillTx/>
+                <a:latin typeface="Calibri" panose="020F0502020204030204"/>
+                <a:ea typeface="+mn-ea"/>
+                <a:cs typeface="+mn-cs"/>
+              </a:rPr>
+              <a:t>This </a:t>
+            </a:r>
+            <a:r>
+              <a:rPr kumimoji="0" lang="en-US" sz="1800" b="0" i="0" u="none" strike="noStrike" kern="1200" cap="none" spc="0" normalizeH="0" baseline="0" noProof="0" dirty="0">
+                <a:ln>
+                  <a:noFill/>
+                </a:ln>
+                <a:solidFill>
+                  <a:prstClr val="black"/>
+                </a:solidFill>
+                <a:effectLst/>
+                <a:uLnTx/>
+                <a:uFillTx/>
+                <a:latin typeface="Calibri" panose="020F0502020204030204"/>
+                <a:ea typeface="+mn-ea"/>
+                <a:cs typeface="+mn-cs"/>
+              </a:rPr>
+              <a:t>work is licensed under a </a:t>
+            </a:r>
+            <a:r>
+              <a:rPr kumimoji="0" lang="en-US" sz="1800" b="0" i="1" u="none" strike="noStrike" kern="1200" cap="none" spc="0" normalizeH="0" baseline="0" noProof="0" dirty="0">
+                <a:ln>
+                  <a:noFill/>
+                </a:ln>
+                <a:solidFill>
+                  <a:prstClr val="black"/>
+                </a:solidFill>
+                <a:effectLst/>
+                <a:uLnTx/>
+                <a:uFillTx/>
+                <a:latin typeface="Calibri" panose="020F0502020204030204"/>
+                <a:ea typeface="+mn-ea"/>
+                <a:cs typeface="+mn-cs"/>
+                <a:hlinkClick r:id="rId2"/>
+              </a:rPr>
+              <a:t>CC BY-SA 4.0</a:t>
+            </a:r>
+            <a:r>
+              <a:rPr kumimoji="0" lang="en-US" sz="1800" b="0" i="0" u="none" strike="noStrike" kern="1200" cap="none" spc="0" normalizeH="0" baseline="0" noProof="0" dirty="0">
+                <a:ln>
+                  <a:noFill/>
+                </a:ln>
+                <a:solidFill>
+                  <a:prstClr val="black"/>
+                </a:solidFill>
+                <a:effectLst/>
+                <a:uLnTx/>
+                <a:uFillTx/>
+                <a:latin typeface="Calibri" panose="020F0502020204030204"/>
+                <a:ea typeface="+mn-ea"/>
+                <a:cs typeface="+mn-cs"/>
+                <a:hlinkClick r:id="rId2"/>
+              </a:rPr>
+              <a:t> license</a:t>
+            </a:r>
+            <a:r>
+              <a:rPr kumimoji="0" lang="en-US" sz="1800" b="0" i="0" u="none" strike="noStrike" kern="1200" cap="none" spc="0" normalizeH="0" baseline="0" noProof="0" dirty="0" smtClean="0">
+                <a:ln>
+                  <a:noFill/>
+                </a:ln>
+                <a:solidFill>
+                  <a:prstClr val="black"/>
+                </a:solidFill>
+                <a:effectLst/>
+                <a:uLnTx/>
+                <a:uFillTx/>
+                <a:latin typeface="Calibri" panose="020F0502020204030204"/>
+                <a:ea typeface="+mn-ea"/>
+                <a:cs typeface="+mn-cs"/>
+              </a:rPr>
+              <a:t>.</a:t>
+            </a:r>
+          </a:p>
+        </p:txBody>
+      </p:sp>
+      <p:pic>
+        <p:nvPicPr>
+          <p:cNvPr id="4" name="Picture 3"/>
+          <p:cNvPicPr>
+            <a:picLocks noChangeAspect="1"/>
+          </p:cNvPicPr>
+          <p:nvPr/>
+        </p:nvPicPr>
+        <p:blipFill>
+          <a:blip r:embed="rId3">
+            <a:extLst>
+              <a:ext uri="{28A0092B-C50C-407E-A947-70E740481C1C}">
+                <a14:useLocalDpi xmlns:a14="http://schemas.microsoft.com/office/drawing/2010/main" val="0"/>
+              </a:ext>
+            </a:extLst>
+          </a:blip>
+          <a:stretch>
+            <a:fillRect/>
+          </a:stretch>
+        </p:blipFill>
+        <p:spPr>
+          <a:xfrm>
+            <a:off x="3871526" y="183180"/>
+            <a:ext cx="4144562" cy="1974357"/>
+          </a:xfrm>
+          <a:prstGeom prst="rect">
+            <a:avLst/>
+          </a:prstGeom>
+        </p:spPr>
+      </p:pic>
+      <p:pic>
+        <p:nvPicPr>
+          <p:cNvPr id="5" name="Picture 4"/>
+          <p:cNvPicPr>
+            <a:picLocks noChangeAspect="1"/>
+          </p:cNvPicPr>
+          <p:nvPr/>
+        </p:nvPicPr>
+        <p:blipFill>
+          <a:blip r:embed="rId4" cstate="print">
+            <a:extLst>
+              <a:ext uri="{28A0092B-C50C-407E-A947-70E740481C1C}">
+                <a14:useLocalDpi xmlns:a14="http://schemas.microsoft.com/office/drawing/2010/main" val="0"/>
+              </a:ext>
+            </a:extLst>
+          </a:blip>
+          <a:stretch>
+            <a:fillRect/>
+          </a:stretch>
+        </p:blipFill>
+        <p:spPr>
+          <a:xfrm>
+            <a:off x="3871526" y="2665442"/>
+            <a:ext cx="4144562" cy="1450084"/>
+          </a:xfrm>
+          <a:prstGeom prst="rect">
+            <a:avLst/>
+          </a:prstGeom>
+        </p:spPr>
+      </p:pic>
+      <p:sp>
+        <p:nvSpPr>
+          <p:cNvPr id="7" name="TextBox 6"/>
+          <p:cNvSpPr txBox="1"/>
+          <p:nvPr/>
+        </p:nvSpPr>
+        <p:spPr>
+          <a:xfrm>
+            <a:off x="3432638" y="2254518"/>
+            <a:ext cx="5022337" cy="276999"/>
+          </a:xfrm>
+          <a:prstGeom prst="rect">
+            <a:avLst/>
+          </a:prstGeom>
+          <a:noFill/>
+        </p:spPr>
+        <p:txBody>
+          <a:bodyPr wrap="none" lIns="0" tIns="0" rIns="0" bIns="0" rtlCol="0">
+            <a:spAutoFit/>
+          </a:bodyPr>
+          <a:lstStyle/>
+          <a:p>
+            <a:pPr marL="0" marR="0" lvl="0" indent="0" algn="l" defTabSz="914400" rtl="0" eaLnBrk="1" fontAlgn="auto" latinLnBrk="0" hangingPunct="1">
+              <a:lnSpc>
+                <a:spcPct val="100000"/>
+              </a:lnSpc>
+              <a:spcBef>
+                <a:spcPts val="0"/>
+              </a:spcBef>
+              <a:spcAft>
+                <a:spcPts val="0"/>
+              </a:spcAft>
+              <a:buClrTx/>
+              <a:buSzTx/>
+              <a:buFontTx/>
+              <a:buNone/>
+              <a:tabLst/>
+              <a:defRPr/>
+            </a:pPr>
+            <a:r>
+              <a:rPr kumimoji="0" lang="en-US" sz="1800" b="0" i="0" u="none" strike="noStrike" kern="1200" cap="none" spc="0" normalizeH="0" baseline="0" noProof="0" dirty="0">
+                <a:ln>
+                  <a:noFill/>
+                </a:ln>
+                <a:solidFill>
+                  <a:prstClr val="black"/>
+                </a:solidFill>
+                <a:effectLst/>
+                <a:uLnTx/>
+                <a:uFillTx/>
+                <a:latin typeface="Calibri" panose="020F0502020204030204"/>
+                <a:ea typeface="+mn-ea"/>
+                <a:cs typeface="+mn-cs"/>
+              </a:rPr>
+              <a:t>© </a:t>
+            </a:r>
+            <a:r>
+              <a:rPr kumimoji="0" lang="en-US" sz="1800" b="0" i="0" u="none" strike="noStrike" kern="1200" cap="none" spc="0" normalizeH="0" baseline="0" noProof="0" dirty="0" smtClean="0">
+                <a:ln>
+                  <a:noFill/>
+                </a:ln>
+                <a:solidFill>
+                  <a:prstClr val="black"/>
+                </a:solidFill>
+                <a:effectLst/>
+                <a:uLnTx/>
+                <a:uFillTx/>
+                <a:latin typeface="Calibri" panose="020F0502020204030204"/>
+                <a:ea typeface="+mn-ea"/>
+                <a:cs typeface="+mn-cs"/>
+              </a:rPr>
+              <a:t>2021-2023, </a:t>
+            </a:r>
+            <a:r>
+              <a:rPr kumimoji="0" lang="en-US" sz="1800" b="0" i="0" u="none" strike="noStrike" kern="1200" cap="none" spc="0" normalizeH="0" baseline="0" noProof="0" dirty="0">
+                <a:ln>
+                  <a:noFill/>
+                </a:ln>
+                <a:solidFill>
+                  <a:prstClr val="black"/>
+                </a:solidFill>
+                <a:effectLst/>
+                <a:uLnTx/>
+                <a:uFillTx/>
+                <a:latin typeface="Calibri" panose="020F0502020204030204"/>
+                <a:ea typeface="+mn-ea"/>
+                <a:cs typeface="+mn-cs"/>
+                <a:hlinkClick r:id="rId5"/>
+              </a:rPr>
+              <a:t>Modelica Association</a:t>
+            </a:r>
+            <a:r>
+              <a:rPr kumimoji="0" lang="en-US" sz="1800" b="0" i="0" u="none" strike="noStrike" kern="1200" cap="none" spc="0" normalizeH="0" baseline="0" noProof="0" dirty="0">
+                <a:ln>
+                  <a:noFill/>
+                </a:ln>
+                <a:solidFill>
+                  <a:prstClr val="black"/>
+                </a:solidFill>
+                <a:effectLst/>
+                <a:uLnTx/>
+                <a:uFillTx/>
+                <a:latin typeface="Calibri" panose="020F0502020204030204"/>
+                <a:ea typeface="+mn-ea"/>
+                <a:cs typeface="+mn-cs"/>
+              </a:rPr>
+              <a:t> and contributors</a:t>
+            </a:r>
+            <a:r>
+              <a:rPr kumimoji="0" lang="en-US" sz="1800" b="0" i="0" u="none" strike="noStrike" kern="1200" cap="none" spc="0" normalizeH="0" baseline="0" noProof="0" dirty="0" smtClean="0">
+                <a:ln>
+                  <a:noFill/>
+                </a:ln>
+                <a:solidFill>
+                  <a:prstClr val="black"/>
+                </a:solidFill>
+                <a:effectLst/>
+                <a:uLnTx/>
+                <a:uFillTx/>
+                <a:latin typeface="Calibri" panose="020F0502020204030204"/>
+                <a:ea typeface="+mn-ea"/>
+                <a:cs typeface="+mn-cs"/>
+              </a:rPr>
+              <a:t>.</a:t>
+            </a:r>
+          </a:p>
+        </p:txBody>
+      </p:sp>
+      <p:sp>
+        <p:nvSpPr>
+          <p:cNvPr id="8" name="TextBox 7"/>
+          <p:cNvSpPr txBox="1"/>
+          <p:nvPr/>
+        </p:nvSpPr>
+        <p:spPr>
+          <a:xfrm>
+            <a:off x="2483084" y="4748557"/>
+            <a:ext cx="6921446" cy="1938992"/>
+          </a:xfrm>
+          <a:prstGeom prst="rect">
+            <a:avLst/>
+          </a:prstGeom>
+          <a:noFill/>
+        </p:spPr>
+        <p:txBody>
+          <a:bodyPr wrap="none" lIns="0" tIns="0" rIns="0" bIns="0" rtlCol="0">
+            <a:spAutoFit/>
+          </a:bodyPr>
+          <a:lstStyle/>
+          <a:p>
+            <a:pPr marL="0" marR="0" lvl="0" indent="0" algn="ctr" defTabSz="914400" rtl="0" eaLnBrk="1" fontAlgn="auto" latinLnBrk="0" hangingPunct="1">
+              <a:lnSpc>
+                <a:spcPct val="100000"/>
+              </a:lnSpc>
+              <a:spcBef>
+                <a:spcPts val="0"/>
+              </a:spcBef>
+              <a:spcAft>
+                <a:spcPts val="0"/>
+              </a:spcAft>
+              <a:buClrTx/>
+              <a:buSzTx/>
+              <a:buFontTx/>
+              <a:buNone/>
+              <a:tabLst/>
+              <a:defRPr/>
+            </a:pPr>
+            <a:r>
+              <a:rPr kumimoji="0" lang="en-US" sz="1800" b="0" i="0" u="none" strike="noStrike" kern="1200" cap="none" spc="0" normalizeH="0" baseline="0" noProof="0" dirty="0" smtClean="0">
+                <a:ln>
+                  <a:noFill/>
+                </a:ln>
+                <a:solidFill>
+                  <a:prstClr val="black"/>
+                </a:solidFill>
+                <a:effectLst/>
+                <a:uLnTx/>
+                <a:uFillTx/>
+                <a:latin typeface="Calibri" panose="020F0502020204030204"/>
+                <a:ea typeface="+mn-ea"/>
+                <a:cs typeface="+mn-cs"/>
+              </a:rPr>
+              <a:t>Modelica</a:t>
+            </a:r>
+            <a:r>
+              <a:rPr kumimoji="0" lang="en-US" sz="1800" b="0" i="0" u="none" strike="noStrike" kern="1200" cap="none" spc="0" normalizeH="0" baseline="0" noProof="0" dirty="0">
+                <a:ln>
+                  <a:noFill/>
+                </a:ln>
+                <a:solidFill>
+                  <a:prstClr val="black"/>
+                </a:solidFill>
+                <a:effectLst/>
+                <a:uLnTx/>
+                <a:uFillTx/>
+                <a:latin typeface="Calibri" panose="020F0502020204030204"/>
+                <a:ea typeface="+mn-ea"/>
+                <a:cs typeface="+mn-cs"/>
+              </a:rPr>
+              <a:t>® is a registered trademark of the Modelica Association.</a:t>
+            </a:r>
+          </a:p>
+          <a:p>
+            <a:pPr marL="0" marR="0" lvl="0" indent="0" algn="ctr" defTabSz="914400" rtl="0" eaLnBrk="1" fontAlgn="auto" latinLnBrk="0" hangingPunct="1">
+              <a:lnSpc>
+                <a:spcPct val="100000"/>
+              </a:lnSpc>
+              <a:spcBef>
+                <a:spcPts val="0"/>
+              </a:spcBef>
+              <a:spcAft>
+                <a:spcPts val="0"/>
+              </a:spcAft>
+              <a:buClrTx/>
+              <a:buSzTx/>
+              <a:buFontTx/>
+              <a:buNone/>
+              <a:tabLst/>
+              <a:defRPr/>
+            </a:pPr>
+            <a:r>
+              <a:rPr kumimoji="0" lang="en-US" sz="1800" b="0" i="0" u="none" strike="noStrike" kern="1200" cap="none" spc="0" normalizeH="0" baseline="0" noProof="0" dirty="0" err="1">
+                <a:ln>
+                  <a:noFill/>
+                </a:ln>
+                <a:solidFill>
+                  <a:prstClr val="black"/>
+                </a:solidFill>
+                <a:effectLst/>
+                <a:uLnTx/>
+                <a:uFillTx/>
+                <a:latin typeface="Calibri" panose="020F0502020204030204"/>
+                <a:ea typeface="+mn-ea"/>
+                <a:cs typeface="+mn-cs"/>
+              </a:rPr>
+              <a:t>eFMI</a:t>
+            </a:r>
+            <a:r>
+              <a:rPr kumimoji="0" lang="en-US" sz="1800" b="0" i="0" u="none" strike="noStrike" kern="1200" cap="none" spc="0" normalizeH="0" baseline="0" noProof="0" dirty="0">
+                <a:ln>
+                  <a:noFill/>
+                </a:ln>
+                <a:solidFill>
+                  <a:prstClr val="black"/>
+                </a:solidFill>
+                <a:effectLst/>
+                <a:uLnTx/>
+                <a:uFillTx/>
+                <a:latin typeface="Calibri" panose="020F0502020204030204"/>
+                <a:ea typeface="+mn-ea"/>
+                <a:cs typeface="+mn-cs"/>
+              </a:rPr>
+              <a:t>® is a registered trademark of the Modelica Association.</a:t>
+            </a:r>
+          </a:p>
+          <a:p>
+            <a:pPr marL="0" marR="0" lvl="0" indent="0" algn="ctr" defTabSz="914400" rtl="0" eaLnBrk="1" fontAlgn="auto" latinLnBrk="0" hangingPunct="1">
+              <a:lnSpc>
+                <a:spcPct val="100000"/>
+              </a:lnSpc>
+              <a:spcBef>
+                <a:spcPts val="0"/>
+              </a:spcBef>
+              <a:spcAft>
+                <a:spcPts val="0"/>
+              </a:spcAft>
+              <a:buClrTx/>
+              <a:buSzTx/>
+              <a:buFontTx/>
+              <a:buNone/>
+              <a:tabLst/>
+              <a:defRPr/>
+            </a:pPr>
+            <a:r>
+              <a:rPr kumimoji="0" lang="en-US" sz="1800" b="0" i="0" u="none" strike="noStrike" kern="1200" cap="none" spc="0" normalizeH="0" baseline="0" noProof="0" dirty="0">
+                <a:ln>
+                  <a:noFill/>
+                </a:ln>
+                <a:solidFill>
+                  <a:prstClr val="black"/>
+                </a:solidFill>
+                <a:effectLst/>
+                <a:uLnTx/>
+                <a:uFillTx/>
+                <a:latin typeface="Calibri" panose="020F0502020204030204"/>
+                <a:ea typeface="+mn-ea"/>
+                <a:cs typeface="+mn-cs"/>
+              </a:rPr>
+              <a:t>FMI® is a registered trademark of the Modelica Association.</a:t>
+            </a:r>
+          </a:p>
+          <a:p>
+            <a:pPr marL="0" marR="0" lvl="0" indent="0" algn="ctr" defTabSz="914400" rtl="0" eaLnBrk="1" fontAlgn="auto" latinLnBrk="0" hangingPunct="1">
+              <a:lnSpc>
+                <a:spcPct val="100000"/>
+              </a:lnSpc>
+              <a:spcBef>
+                <a:spcPts val="0"/>
+              </a:spcBef>
+              <a:spcAft>
+                <a:spcPts val="0"/>
+              </a:spcAft>
+              <a:buClrTx/>
+              <a:buSzTx/>
+              <a:buFontTx/>
+              <a:buNone/>
+              <a:tabLst/>
+              <a:defRPr/>
+            </a:pPr>
+            <a:r>
+              <a:rPr kumimoji="0" lang="en-US" sz="1800" b="0" i="0" u="none" strike="noStrike" kern="1200" cap="none" spc="0" normalizeH="0" baseline="0" noProof="0" dirty="0">
+                <a:ln>
+                  <a:noFill/>
+                </a:ln>
+                <a:solidFill>
+                  <a:prstClr val="black"/>
+                </a:solidFill>
+                <a:effectLst/>
+                <a:uLnTx/>
+                <a:uFillTx/>
+                <a:latin typeface="Calibri" panose="020F0502020204030204"/>
+                <a:ea typeface="+mn-ea"/>
+                <a:cs typeface="+mn-cs"/>
+              </a:rPr>
+              <a:t>SSP® is a registered trademark of the Modelica Association.</a:t>
+            </a:r>
+          </a:p>
+          <a:p>
+            <a:pPr marL="0" marR="0" lvl="0" indent="0" algn="ctr" defTabSz="914400" rtl="0" eaLnBrk="1" fontAlgn="auto" latinLnBrk="0" hangingPunct="1">
+              <a:lnSpc>
+                <a:spcPct val="100000"/>
+              </a:lnSpc>
+              <a:spcBef>
+                <a:spcPts val="0"/>
+              </a:spcBef>
+              <a:spcAft>
+                <a:spcPts val="0"/>
+              </a:spcAft>
+              <a:buClrTx/>
+              <a:buSzTx/>
+              <a:buFontTx/>
+              <a:buNone/>
+              <a:tabLst/>
+              <a:defRPr/>
+            </a:pPr>
+            <a:r>
+              <a:rPr kumimoji="0" lang="en-US" sz="1800" b="0" i="0" u="none" strike="noStrike" kern="1200" cap="none" spc="0" normalizeH="0" baseline="0" noProof="0" dirty="0">
+                <a:ln>
+                  <a:noFill/>
+                </a:ln>
+                <a:solidFill>
+                  <a:prstClr val="black"/>
+                </a:solidFill>
+                <a:effectLst/>
+                <a:uLnTx/>
+                <a:uFillTx/>
+                <a:latin typeface="Calibri" panose="020F0502020204030204"/>
+                <a:ea typeface="+mn-ea"/>
+                <a:cs typeface="+mn-cs"/>
+              </a:rPr>
+              <a:t>DCP® is a registered trademark of the Modelica Association</a:t>
+            </a:r>
+            <a:r>
+              <a:rPr kumimoji="0" lang="en-US" sz="1800" b="0" i="0" u="none" strike="noStrike" kern="1200" cap="none" spc="0" normalizeH="0" baseline="0" noProof="0" dirty="0" smtClean="0">
+                <a:ln>
+                  <a:noFill/>
+                </a:ln>
+                <a:solidFill>
+                  <a:prstClr val="black"/>
+                </a:solidFill>
+                <a:effectLst/>
+                <a:uLnTx/>
+                <a:uFillTx/>
+                <a:latin typeface="Calibri" panose="020F0502020204030204"/>
+                <a:ea typeface="+mn-ea"/>
+                <a:cs typeface="+mn-cs"/>
+              </a:rPr>
+              <a:t>.</a:t>
+            </a:r>
+          </a:p>
+          <a:p>
+            <a:pPr marL="0" marR="0" lvl="0" indent="0" algn="ctr" defTabSz="914400" rtl="0" eaLnBrk="1" fontAlgn="auto" latinLnBrk="0" hangingPunct="1">
+              <a:lnSpc>
+                <a:spcPct val="100000"/>
+              </a:lnSpc>
+              <a:spcBef>
+                <a:spcPts val="0"/>
+              </a:spcBef>
+              <a:spcAft>
+                <a:spcPts val="0"/>
+              </a:spcAft>
+              <a:buClrTx/>
+              <a:buSzTx/>
+              <a:buFontTx/>
+              <a:buNone/>
+              <a:tabLst/>
+              <a:defRPr/>
+            </a:pPr>
+            <a:endParaRPr kumimoji="0" lang="en-US" sz="1800" b="0" i="0" u="none" strike="noStrike" kern="1200" cap="none" spc="0" normalizeH="0" baseline="0" noProof="0" dirty="0" smtClean="0">
+              <a:ln>
+                <a:noFill/>
+              </a:ln>
+              <a:solidFill>
+                <a:prstClr val="black"/>
+              </a:solidFill>
+              <a:effectLst/>
+              <a:uLnTx/>
+              <a:uFillTx/>
+              <a:latin typeface="Calibri" panose="020F0502020204030204"/>
+              <a:ea typeface="+mn-ea"/>
+              <a:cs typeface="+mn-cs"/>
+            </a:endParaRPr>
+          </a:p>
+          <a:p>
+            <a:pPr marL="0" marR="0" lvl="0" indent="0" algn="ctr" defTabSz="914400" rtl="0" eaLnBrk="1" fontAlgn="auto" latinLnBrk="0" hangingPunct="1">
+              <a:lnSpc>
+                <a:spcPct val="100000"/>
+              </a:lnSpc>
+              <a:spcBef>
+                <a:spcPts val="0"/>
+              </a:spcBef>
+              <a:spcAft>
+                <a:spcPts val="0"/>
+              </a:spcAft>
+              <a:buClrTx/>
+              <a:buSzTx/>
+              <a:buFontTx/>
+              <a:buNone/>
+              <a:tabLst/>
+              <a:defRPr/>
+            </a:pPr>
+            <a:r>
+              <a:rPr kumimoji="0" lang="sv-SE" sz="1800" b="0" i="0" u="none" strike="noStrike" kern="1200" cap="none" spc="0" normalizeH="0" baseline="0" noProof="0" dirty="0" err="1" smtClean="0">
+                <a:ln>
+                  <a:noFill/>
+                </a:ln>
+                <a:solidFill>
+                  <a:prstClr val="black"/>
+                </a:solidFill>
+                <a:effectLst/>
+                <a:uLnTx/>
+                <a:uFillTx/>
+                <a:latin typeface="Calibri" panose="020F0502020204030204"/>
+                <a:ea typeface="+mn-ea"/>
+                <a:cs typeface="+mn-cs"/>
+              </a:rPr>
+              <a:t>Third</a:t>
+            </a:r>
+            <a:r>
+              <a:rPr kumimoji="0" lang="sv-SE" sz="1800" b="0" i="0" u="none" strike="noStrike" kern="1200" cap="none" spc="0" normalizeH="0" baseline="0" noProof="0" dirty="0" smtClean="0">
+                <a:ln>
+                  <a:noFill/>
+                </a:ln>
+                <a:solidFill>
+                  <a:prstClr val="black"/>
+                </a:solidFill>
+                <a:effectLst/>
+                <a:uLnTx/>
+                <a:uFillTx/>
+                <a:latin typeface="Calibri" panose="020F0502020204030204"/>
+                <a:ea typeface="+mn-ea"/>
+                <a:cs typeface="+mn-cs"/>
+              </a:rPr>
+              <a:t> party marks and brands </a:t>
+            </a:r>
+            <a:r>
+              <a:rPr kumimoji="0" lang="sv-SE" sz="1800" b="0" i="0" u="none" strike="noStrike" kern="1200" cap="none" spc="0" normalizeH="0" baseline="0" noProof="0" dirty="0" err="1" smtClean="0">
+                <a:ln>
+                  <a:noFill/>
+                </a:ln>
+                <a:solidFill>
+                  <a:prstClr val="black"/>
+                </a:solidFill>
+                <a:effectLst/>
+                <a:uLnTx/>
+                <a:uFillTx/>
+                <a:latin typeface="Calibri" panose="020F0502020204030204"/>
+                <a:ea typeface="+mn-ea"/>
+                <a:cs typeface="+mn-cs"/>
+              </a:rPr>
+              <a:t>are</a:t>
+            </a:r>
+            <a:r>
+              <a:rPr kumimoji="0" lang="sv-SE" sz="1800" b="0" i="0" u="none" strike="noStrike" kern="1200" cap="none" spc="0" normalizeH="0" baseline="0" noProof="0" dirty="0" smtClean="0">
+                <a:ln>
+                  <a:noFill/>
+                </a:ln>
+                <a:solidFill>
+                  <a:prstClr val="black"/>
+                </a:solidFill>
+                <a:effectLst/>
+                <a:uLnTx/>
+                <a:uFillTx/>
+                <a:latin typeface="Calibri" panose="020F0502020204030204"/>
+                <a:ea typeface="+mn-ea"/>
+                <a:cs typeface="+mn-cs"/>
+              </a:rPr>
+              <a:t> the </a:t>
+            </a:r>
+            <a:r>
+              <a:rPr kumimoji="0" lang="sv-SE" sz="1800" b="0" i="0" u="none" strike="noStrike" kern="1200" cap="none" spc="0" normalizeH="0" baseline="0" noProof="0" dirty="0" err="1" smtClean="0">
+                <a:ln>
+                  <a:noFill/>
+                </a:ln>
+                <a:solidFill>
+                  <a:prstClr val="black"/>
+                </a:solidFill>
+                <a:effectLst/>
+                <a:uLnTx/>
+                <a:uFillTx/>
+                <a:latin typeface="Calibri" panose="020F0502020204030204"/>
+                <a:ea typeface="+mn-ea"/>
+                <a:cs typeface="+mn-cs"/>
+              </a:rPr>
+              <a:t>property</a:t>
+            </a:r>
+            <a:r>
+              <a:rPr kumimoji="0" lang="sv-SE" sz="1800" b="0" i="0" u="none" strike="noStrike" kern="1200" cap="none" spc="0" normalizeH="0" baseline="0" noProof="0" dirty="0" smtClean="0">
+                <a:ln>
+                  <a:noFill/>
+                </a:ln>
+                <a:solidFill>
+                  <a:prstClr val="black"/>
+                </a:solidFill>
+                <a:effectLst/>
+                <a:uLnTx/>
+                <a:uFillTx/>
+                <a:latin typeface="Calibri" panose="020F0502020204030204"/>
+                <a:ea typeface="+mn-ea"/>
+                <a:cs typeface="+mn-cs"/>
+              </a:rPr>
+              <a:t> </a:t>
+            </a:r>
+            <a:r>
+              <a:rPr kumimoji="0" lang="sv-SE" sz="1800" b="0" i="0" u="none" strike="noStrike" kern="1200" cap="none" spc="0" normalizeH="0" baseline="0" noProof="0" dirty="0" err="1" smtClean="0">
+                <a:ln>
+                  <a:noFill/>
+                </a:ln>
+                <a:solidFill>
+                  <a:prstClr val="black"/>
+                </a:solidFill>
+                <a:effectLst/>
+                <a:uLnTx/>
+                <a:uFillTx/>
+                <a:latin typeface="Calibri" panose="020F0502020204030204"/>
+                <a:ea typeface="+mn-ea"/>
+                <a:cs typeface="+mn-cs"/>
+              </a:rPr>
+              <a:t>of</a:t>
+            </a:r>
+            <a:r>
+              <a:rPr kumimoji="0" lang="sv-SE" sz="1800" b="0" i="0" u="none" strike="noStrike" kern="1200" cap="none" spc="0" normalizeH="0" baseline="0" noProof="0" dirty="0" smtClean="0">
+                <a:ln>
+                  <a:noFill/>
+                </a:ln>
+                <a:solidFill>
+                  <a:prstClr val="black"/>
+                </a:solidFill>
+                <a:effectLst/>
+                <a:uLnTx/>
+                <a:uFillTx/>
+                <a:latin typeface="Calibri" panose="020F0502020204030204"/>
+                <a:ea typeface="+mn-ea"/>
+                <a:cs typeface="+mn-cs"/>
+              </a:rPr>
+              <a:t> </a:t>
+            </a:r>
+            <a:r>
+              <a:rPr kumimoji="0" lang="sv-SE" sz="1800" b="0" i="0" u="none" strike="noStrike" kern="1200" cap="none" spc="0" normalizeH="0" baseline="0" noProof="0" dirty="0" err="1" smtClean="0">
+                <a:ln>
+                  <a:noFill/>
+                </a:ln>
+                <a:solidFill>
+                  <a:prstClr val="black"/>
+                </a:solidFill>
+                <a:effectLst/>
+                <a:uLnTx/>
+                <a:uFillTx/>
+                <a:latin typeface="Calibri" panose="020F0502020204030204"/>
+                <a:ea typeface="+mn-ea"/>
+                <a:cs typeface="+mn-cs"/>
+              </a:rPr>
+              <a:t>their</a:t>
+            </a:r>
+            <a:r>
+              <a:rPr kumimoji="0" lang="sv-SE" sz="1800" b="0" i="0" u="none" strike="noStrike" kern="1200" cap="none" spc="0" normalizeH="0" baseline="0" noProof="0" dirty="0" smtClean="0">
+                <a:ln>
+                  <a:noFill/>
+                </a:ln>
+                <a:solidFill>
+                  <a:prstClr val="black"/>
+                </a:solidFill>
+                <a:effectLst/>
+                <a:uLnTx/>
+                <a:uFillTx/>
+                <a:latin typeface="Calibri" panose="020F0502020204030204"/>
+                <a:ea typeface="+mn-ea"/>
+                <a:cs typeface="+mn-cs"/>
+              </a:rPr>
+              <a:t> </a:t>
+            </a:r>
+            <a:r>
+              <a:rPr kumimoji="0" lang="sv-SE" sz="1800" b="0" i="0" u="none" strike="noStrike" kern="1200" cap="none" spc="0" normalizeH="0" baseline="0" noProof="0" dirty="0" err="1" smtClean="0">
+                <a:ln>
+                  <a:noFill/>
+                </a:ln>
+                <a:solidFill>
+                  <a:prstClr val="black"/>
+                </a:solidFill>
+                <a:effectLst/>
+                <a:uLnTx/>
+                <a:uFillTx/>
+                <a:latin typeface="Calibri" panose="020F0502020204030204"/>
+                <a:ea typeface="+mn-ea"/>
+                <a:cs typeface="+mn-cs"/>
+              </a:rPr>
+              <a:t>respective</a:t>
+            </a:r>
+            <a:r>
+              <a:rPr kumimoji="0" lang="sv-SE" sz="1800" b="0" i="0" u="none" strike="noStrike" kern="1200" cap="none" spc="0" normalizeH="0" baseline="0" noProof="0" dirty="0" smtClean="0">
+                <a:ln>
+                  <a:noFill/>
+                </a:ln>
+                <a:solidFill>
+                  <a:prstClr val="black"/>
+                </a:solidFill>
+                <a:effectLst/>
+                <a:uLnTx/>
+                <a:uFillTx/>
+                <a:latin typeface="Calibri" panose="020F0502020204030204"/>
+                <a:ea typeface="+mn-ea"/>
+                <a:cs typeface="+mn-cs"/>
+              </a:rPr>
+              <a:t> </a:t>
+            </a:r>
+            <a:r>
+              <a:rPr kumimoji="0" lang="sv-SE" sz="1800" b="0" i="0" u="none" strike="noStrike" kern="1200" cap="none" spc="0" normalizeH="0" baseline="0" noProof="0" dirty="0" err="1" smtClean="0">
+                <a:ln>
+                  <a:noFill/>
+                </a:ln>
+                <a:solidFill>
+                  <a:prstClr val="black"/>
+                </a:solidFill>
+                <a:effectLst/>
+                <a:uLnTx/>
+                <a:uFillTx/>
+                <a:latin typeface="Calibri" panose="020F0502020204030204"/>
+                <a:ea typeface="+mn-ea"/>
+                <a:cs typeface="+mn-cs"/>
+              </a:rPr>
+              <a:t>holders</a:t>
+            </a:r>
+            <a:r>
+              <a:rPr kumimoji="0" lang="sv-SE" sz="1800" b="0" i="0" u="none" strike="noStrike" kern="1200" cap="none" spc="0" normalizeH="0" baseline="0" noProof="0" dirty="0" smtClean="0">
+                <a:ln>
+                  <a:noFill/>
+                </a:ln>
+                <a:solidFill>
+                  <a:prstClr val="black"/>
+                </a:solidFill>
+                <a:effectLst/>
+                <a:uLnTx/>
+                <a:uFillTx/>
+                <a:latin typeface="Calibri" panose="020F0502020204030204"/>
+                <a:ea typeface="+mn-ea"/>
+                <a:cs typeface="+mn-cs"/>
+              </a:rPr>
+              <a:t>.</a:t>
+            </a:r>
+          </a:p>
+        </p:txBody>
+      </p:sp>
+    </p:spTree>
+    <p:extLst>
+      <p:ext uri="{BB962C8B-B14F-4D97-AF65-F5344CB8AC3E}">
+        <p14:creationId xmlns:p14="http://schemas.microsoft.com/office/powerpoint/2010/main" val="3433323097"/>
+      </p:ext>
+    </p:extLst>
+  </p:cSld>
+  <p:clrMapOvr>
+    <a:masterClrMapping/>
+  </p:clrMapOvr>
+  <p:timing>
+    <p:tnLst>
+      <p:par>
+        <p:cTn id="1" dur="indefinite" restart="never" nodeType="tmRoot"/>
+      </p:par>
+    </p:tnLst>
+  </p:timing>
+</p:sld>
+</file>
+
+<file path=ppt/slides/slide2.xml><?xml version="1.0" encoding="utf-8"?>
+<p:sld xmlns:a="http://schemas.openxmlformats.org/drawingml/2006/main" xmlns:r="http://schemas.openxmlformats.org/officeDocument/2006/relationships" xmlns:p="http://schemas.openxmlformats.org/presentationml/2006/main">
+  <p:cSld>
+    <p:spTree>
+      <p:nvGrpSpPr>
+        <p:cNvPr id="1" name=""/>
+        <p:cNvGrpSpPr/>
+        <p:nvPr/>
+      </p:nvGrpSpPr>
+      <p:grpSpPr>
+        <a:xfrm>
+          <a:off x="0" y="0"/>
+          <a:ext cx="0" cy="0"/>
+          <a:chOff x="0" y="0"/>
+          <a:chExt cx="0" cy="0"/>
+        </a:xfrm>
+      </p:grpSpPr>
+      <p:sp>
+        <p:nvSpPr>
+          <p:cNvPr id="2" name="Title 1"/>
+          <p:cNvSpPr>
+            <a:spLocks noGrp="1"/>
+          </p:cNvSpPr>
+          <p:nvPr>
+            <p:ph type="title"/>
+          </p:nvPr>
+        </p:nvSpPr>
+        <p:spPr/>
+        <p:txBody>
+          <a:bodyPr/>
+          <a:lstStyle/>
+          <a:p>
+            <a:r>
+              <a:rPr lang="sv-SE" dirty="0" err="1" smtClean="0"/>
+              <a:t>License</a:t>
+            </a:r>
+            <a:r>
+              <a:rPr lang="sv-SE" dirty="0" smtClean="0"/>
+              <a:t> for</a:t>
+            </a:r>
+            <a:endParaRPr lang="en-US" dirty="0"/>
+          </a:p>
+        </p:txBody>
+      </p:sp>
+      <p:sp>
+        <p:nvSpPr>
+          <p:cNvPr id="3" name="Content Placeholder 2"/>
+          <p:cNvSpPr>
+            <a:spLocks noGrp="1"/>
+          </p:cNvSpPr>
+          <p:nvPr>
+            <p:ph idx="1"/>
+          </p:nvPr>
+        </p:nvSpPr>
+        <p:spPr/>
+        <p:txBody>
+          <a:bodyPr>
+            <a:normAutofit fontScale="25000" lnSpcReduction="20000"/>
+          </a:bodyPr>
+          <a:lstStyle/>
+          <a:p>
+            <a:pPr marL="0" indent="0">
+              <a:buNone/>
+            </a:pPr>
+            <a:r>
+              <a:rPr lang="en-US" b="1" dirty="0">
+                <a:hlinkClick r:id="rId2"/>
+              </a:rPr>
+              <a:t>https://pixabay.com/illustrations/education-online-school-elearning-5307517</a:t>
+            </a:r>
+            <a:r>
+              <a:rPr lang="en-US" b="1" dirty="0" smtClean="0">
+                <a:hlinkClick r:id="rId2"/>
+              </a:rPr>
+              <a:t>/</a:t>
+            </a:r>
+            <a:endParaRPr lang="en-US" b="1" dirty="0" smtClean="0"/>
+          </a:p>
+          <a:p>
+            <a:pPr marL="0" indent="0">
+              <a:buNone/>
+            </a:pPr>
+            <a:r>
+              <a:rPr lang="en-US" dirty="0" smtClean="0"/>
+              <a:t>©</a:t>
+            </a:r>
+            <a:r>
+              <a:rPr lang="sv-SE" b="1" dirty="0"/>
+              <a:t> June 17, </a:t>
+            </a:r>
+            <a:r>
+              <a:rPr lang="sv-SE" b="1" dirty="0" smtClean="0"/>
+              <a:t>2020 by </a:t>
+            </a:r>
+            <a:r>
+              <a:rPr lang="en-US" b="1" dirty="0" err="1" smtClean="0"/>
+              <a:t>ArtsyBee</a:t>
+            </a:r>
+            <a:endParaRPr lang="en-US" b="1" dirty="0" smtClean="0"/>
+          </a:p>
+          <a:p>
+            <a:pPr marL="0" indent="0">
+              <a:buNone/>
+            </a:pPr>
+            <a:r>
+              <a:rPr lang="en-US" dirty="0"/>
+              <a:t>I create these images with love and like to share them with you. My passion is to provide vintage designs to honor those artists that created something great and timeless. You are most welcome to use it for commercial projects, no need to ask for permission. I only ask that you not resell my images AS IS or claim them as your own creation. As always, a BIG thank you for the coffee donations I received, every dollar is a blessing for my family.</a:t>
+            </a:r>
+            <a:endParaRPr lang="en-US" b="1" dirty="0" smtClean="0"/>
+          </a:p>
+          <a:p>
+            <a:pPr marL="0" indent="0">
+              <a:buNone/>
+            </a:pPr>
+            <a:r>
+              <a:rPr lang="en-US" b="1" dirty="0" smtClean="0"/>
+              <a:t>Education </a:t>
+            </a:r>
+            <a:r>
+              <a:rPr lang="en-US" b="1" dirty="0"/>
+              <a:t>Online School royalty-free stock illustration. Free for use &amp; download</a:t>
+            </a:r>
+            <a:r>
+              <a:rPr lang="en-US" b="1" dirty="0" smtClean="0"/>
+              <a:t>.</a:t>
+            </a:r>
+          </a:p>
+          <a:p>
+            <a:pPr marL="0" indent="0">
+              <a:buNone/>
+            </a:pPr>
+            <a:r>
+              <a:rPr lang="en-US" b="1" dirty="0" smtClean="0"/>
+              <a:t>Content </a:t>
+            </a:r>
+            <a:r>
+              <a:rPr lang="en-US" b="1" dirty="0"/>
+              <a:t>License </a:t>
+            </a:r>
+            <a:r>
+              <a:rPr lang="en-US" b="1" dirty="0" smtClean="0"/>
+              <a:t>Summary</a:t>
+            </a:r>
+          </a:p>
+          <a:p>
+            <a:pPr marL="0" indent="0">
+              <a:buNone/>
+            </a:pPr>
+            <a:r>
+              <a:rPr lang="en-US" dirty="0"/>
+              <a:t>Welcome to </a:t>
+            </a:r>
+            <a:r>
+              <a:rPr lang="en-US" dirty="0" err="1"/>
+              <a:t>Pixabay</a:t>
+            </a:r>
+            <a:r>
+              <a:rPr lang="en-US" dirty="0"/>
+              <a:t>! </a:t>
+            </a:r>
+            <a:r>
+              <a:rPr lang="en-US" dirty="0" err="1"/>
+              <a:t>Pixabay</a:t>
+            </a:r>
+            <a:r>
+              <a:rPr lang="en-US" dirty="0"/>
+              <a:t> is a vibrant community of authors, artists and creators sharing royalty-free images, video, audio and other media. We refer to this collectively as “</a:t>
+            </a:r>
+            <a:r>
+              <a:rPr lang="en-US" b="1" dirty="0"/>
+              <a:t>Content</a:t>
+            </a:r>
+            <a:r>
+              <a:rPr lang="en-US" dirty="0"/>
+              <a:t>”. By accessing and using Content, or by contributing Content, you agree to comply with our Content License. </a:t>
+            </a:r>
+            <a:br>
+              <a:rPr lang="en-US" dirty="0"/>
+            </a:br>
+            <a:r>
+              <a:rPr lang="en-US" dirty="0"/>
+              <a:t/>
+            </a:r>
+            <a:br>
+              <a:rPr lang="en-US" dirty="0"/>
+            </a:br>
+            <a:r>
+              <a:rPr lang="en-US" dirty="0"/>
+              <a:t>At </a:t>
+            </a:r>
+            <a:r>
+              <a:rPr lang="en-US" dirty="0" err="1"/>
+              <a:t>Pixabay</a:t>
+            </a:r>
+            <a:r>
+              <a:rPr lang="en-US" dirty="0"/>
+              <a:t>, we like to keep things as simple as possible. For this reason, we have created this short summary of our Content License which is available in full </a:t>
+            </a:r>
+            <a:r>
+              <a:rPr lang="en-US" dirty="0">
+                <a:hlinkClick r:id="rId3"/>
+              </a:rPr>
+              <a:t>here</a:t>
+            </a:r>
+            <a:r>
+              <a:rPr lang="en-US" dirty="0"/>
+              <a:t>. Please keep in mind that only the full Content License is legally binding</a:t>
+            </a:r>
+            <a:r>
+              <a:rPr lang="en-US" dirty="0" smtClean="0"/>
+              <a:t>.</a:t>
+            </a:r>
+          </a:p>
+          <a:p>
+            <a:pPr marL="0" indent="0">
+              <a:buNone/>
+            </a:pPr>
+            <a:r>
+              <a:rPr lang="en-US" b="1" dirty="0"/>
+              <a:t>What are you allowed to do with Content?</a:t>
+            </a:r>
+          </a:p>
+          <a:p>
+            <a:r>
+              <a:rPr lang="en-US" dirty="0"/>
+              <a:t>Subject to the Prohibited Uses (see below), the Content License allows users to:</a:t>
+            </a:r>
+          </a:p>
+          <a:p>
+            <a:r>
+              <a:rPr lang="en-US" dirty="0"/>
+              <a:t>Use Content for free</a:t>
+            </a:r>
+          </a:p>
+          <a:p>
+            <a:r>
+              <a:rPr lang="en-US" dirty="0"/>
+              <a:t>Use Content without having to attribute the author (although giving credit is always appreciated by our community!)</a:t>
+            </a:r>
+          </a:p>
+          <a:p>
+            <a:r>
+              <a:rPr lang="en-US" dirty="0"/>
+              <a:t>Modify or adapt Content into new works</a:t>
+            </a:r>
+          </a:p>
+          <a:p>
+            <a:pPr marL="0" indent="0">
+              <a:buNone/>
+            </a:pPr>
+            <a:r>
+              <a:rPr lang="en-US" b="1" dirty="0"/>
+              <a:t>What are you not allowed to do with Content?</a:t>
+            </a:r>
+          </a:p>
+          <a:p>
+            <a:pPr marL="0" indent="0">
+              <a:buNone/>
+            </a:pPr>
+            <a:r>
+              <a:rPr lang="en-US" dirty="0"/>
+              <a:t>We refer to these as Prohibited Uses which include:</a:t>
+            </a:r>
+          </a:p>
+          <a:p>
+            <a:r>
+              <a:rPr lang="en-US" dirty="0"/>
+              <a:t>You cannot sell or distribute Content (either in digital or physical form) on a Standalone basis. Standalone means where no creative effort has been applied to the Content and it remains in substantially the same form as it exists on our website.</a:t>
+            </a:r>
+          </a:p>
+          <a:p>
+            <a:r>
+              <a:rPr lang="en-US" dirty="0"/>
+              <a:t>If Content contains any </a:t>
+            </a:r>
+            <a:r>
+              <a:rPr lang="en-US" dirty="0" err="1"/>
+              <a:t>recognisable</a:t>
+            </a:r>
+            <a:r>
+              <a:rPr lang="en-US" dirty="0"/>
+              <a:t> trademarks, logos or brands, you cannot use that Content for commercial purposes in relation to goods and services. In particular, you cannot print that Content on merchandise or other physical products for sale.</a:t>
+            </a:r>
+          </a:p>
+          <a:p>
+            <a:r>
+              <a:rPr lang="en-US" dirty="0"/>
+              <a:t>You cannot use Content in any immoral or illegal way, especially Content which features </a:t>
+            </a:r>
+            <a:r>
+              <a:rPr lang="en-US" dirty="0" err="1"/>
+              <a:t>recognisable</a:t>
+            </a:r>
+            <a:r>
+              <a:rPr lang="en-US" dirty="0"/>
+              <a:t> people.</a:t>
+            </a:r>
+          </a:p>
+          <a:p>
+            <a:r>
+              <a:rPr lang="en-US" dirty="0"/>
+              <a:t>You cannot use Content in a misleading or deceptive way.</a:t>
+            </a:r>
+          </a:p>
+          <a:p>
+            <a:r>
+              <a:rPr lang="en-US" dirty="0"/>
+              <a:t>Please be aware that certain Content may be subject to additional intellectual property rights (such as copyrights, trademarks, design rights), moral rights, proprietary rights, property rights, privacy rights or similar. It is your responsibility to check whether you require the consent of a third party or a license to use Content.</a:t>
+            </a:r>
+          </a:p>
+          <a:p>
+            <a:pPr marL="0" indent="0">
+              <a:buNone/>
+            </a:pPr>
+            <a:endParaRPr lang="en-US" dirty="0"/>
+          </a:p>
+        </p:txBody>
+      </p:sp>
+      <p:pic>
+        <p:nvPicPr>
+          <p:cNvPr id="4" name="Picture 3"/>
+          <p:cNvPicPr>
+            <a:picLocks noChangeAspect="1"/>
+          </p:cNvPicPr>
+          <p:nvPr/>
+        </p:nvPicPr>
+        <p:blipFill>
+          <a:blip r:embed="rId4" cstate="print">
+            <a:extLst>
+              <a:ext uri="{28A0092B-C50C-407E-A947-70E740481C1C}">
+                <a14:useLocalDpi xmlns:a14="http://schemas.microsoft.com/office/drawing/2010/main" val="0"/>
+              </a:ext>
+            </a:extLst>
+          </a:blip>
+          <a:stretch>
+            <a:fillRect/>
+          </a:stretch>
+        </p:blipFill>
+        <p:spPr>
+          <a:xfrm>
+            <a:off x="3538513" y="423662"/>
+            <a:ext cx="1578433" cy="1208488"/>
+          </a:xfrm>
+          <a:prstGeom prst="rect">
+            <a:avLst/>
+          </a:prstGeom>
+        </p:spPr>
+      </p:pic>
+    </p:spTree>
+    <p:extLst>
+      <p:ext uri="{BB962C8B-B14F-4D97-AF65-F5344CB8AC3E}">
+        <p14:creationId xmlns:p14="http://schemas.microsoft.com/office/powerpoint/2010/main" val="1820999432"/>
+      </p:ext>
+    </p:extLst>
+  </p:cSld>
+  <p:clrMapOvr>
+    <a:masterClrMapping/>
+  </p:clrMapOvr>
+</p:sld>
+</file>
+
+<file path=ppt/slides/slide3.xml><?xml version="1.0" encoding="utf-8"?>
+<p:sld xmlns:a="http://schemas.openxmlformats.org/drawingml/2006/main" xmlns:r="http://schemas.openxmlformats.org/officeDocument/2006/relationships" xmlns:p="http://schemas.openxmlformats.org/presentationml/2006/main">
+  <p:cSld>
+    <p:spTree>
+      <p:nvGrpSpPr>
+        <p:cNvPr id="1" name=""/>
+        <p:cNvGrpSpPr/>
+        <p:nvPr/>
+      </p:nvGrpSpPr>
+      <p:grpSpPr>
+        <a:xfrm>
+          <a:off x="0" y="0"/>
+          <a:ext cx="0" cy="0"/>
+          <a:chOff x="0" y="0"/>
+          <a:chExt cx="0" cy="0"/>
+        </a:xfrm>
+      </p:grpSpPr>
       <p:pic>
         <p:nvPicPr>
           <p:cNvPr id="8" name="Picture 7"/>
@@ -4377,367 +5637,6 @@
       </p:par>
     </p:tnLst>
   </p:timing>
-</p:sld>
-</file>
-
-<file path=ppt/slides/slide2.xml><?xml version="1.0" encoding="utf-8"?>
-<p:sld xmlns:a="http://schemas.openxmlformats.org/drawingml/2006/main" xmlns:r="http://schemas.openxmlformats.org/officeDocument/2006/relationships" xmlns:p="http://schemas.openxmlformats.org/presentationml/2006/main">
-  <p:cSld>
-    <p:spTree>
-      <p:nvGrpSpPr>
-        <p:cNvPr id="1" name=""/>
-        <p:cNvGrpSpPr/>
-        <p:nvPr/>
-      </p:nvGrpSpPr>
-      <p:grpSpPr>
-        <a:xfrm>
-          <a:off x="0" y="0"/>
-          <a:ext cx="0" cy="0"/>
-          <a:chOff x="0" y="0"/>
-          <a:chExt cx="0" cy="0"/>
-        </a:xfrm>
-      </p:grpSpPr>
-      <p:sp>
-        <p:nvSpPr>
-          <p:cNvPr id="2" name="Title 1"/>
-          <p:cNvSpPr>
-            <a:spLocks noGrp="1"/>
-          </p:cNvSpPr>
-          <p:nvPr>
-            <p:ph type="title"/>
-          </p:nvPr>
-        </p:nvSpPr>
-        <p:spPr/>
-        <p:txBody>
-          <a:bodyPr/>
-          <a:lstStyle/>
-          <a:p>
-            <a:r>
-              <a:rPr lang="sv-SE" dirty="0" err="1" smtClean="0"/>
-              <a:t>License</a:t>
-            </a:r>
-            <a:r>
-              <a:rPr lang="sv-SE" dirty="0" smtClean="0"/>
-              <a:t> for</a:t>
-            </a:r>
-            <a:endParaRPr lang="en-US" dirty="0"/>
-          </a:p>
-        </p:txBody>
-      </p:sp>
-      <p:sp>
-        <p:nvSpPr>
-          <p:cNvPr id="3" name="Content Placeholder 2"/>
-          <p:cNvSpPr>
-            <a:spLocks noGrp="1"/>
-          </p:cNvSpPr>
-          <p:nvPr>
-            <p:ph idx="1"/>
-          </p:nvPr>
-        </p:nvSpPr>
-        <p:spPr/>
-        <p:txBody>
-          <a:bodyPr>
-            <a:normAutofit fontScale="25000" lnSpcReduction="20000"/>
-          </a:bodyPr>
-          <a:lstStyle/>
-          <a:p>
-            <a:pPr marL="0" indent="0">
-              <a:buNone/>
-            </a:pPr>
-            <a:r>
-              <a:rPr lang="en-US" b="1" dirty="0">
-                <a:hlinkClick r:id="rId2"/>
-              </a:rPr>
-              <a:t>https://pixabay.com/illustrations/education-online-school-elearning-5307517</a:t>
-            </a:r>
-            <a:r>
-              <a:rPr lang="en-US" b="1" dirty="0" smtClean="0">
-                <a:hlinkClick r:id="rId2"/>
-              </a:rPr>
-              <a:t>/</a:t>
-            </a:r>
-            <a:endParaRPr lang="en-US" b="1" dirty="0" smtClean="0"/>
-          </a:p>
-          <a:p>
-            <a:pPr marL="0" indent="0">
-              <a:buNone/>
-            </a:pPr>
-            <a:r>
-              <a:rPr lang="en-US" dirty="0" smtClean="0"/>
-              <a:t>©</a:t>
-            </a:r>
-            <a:r>
-              <a:rPr lang="sv-SE" b="1" dirty="0"/>
-              <a:t> June 17, </a:t>
-            </a:r>
-            <a:r>
-              <a:rPr lang="sv-SE" b="1" dirty="0" smtClean="0"/>
-              <a:t>2020 by </a:t>
-            </a:r>
-            <a:r>
-              <a:rPr lang="en-US" b="1" dirty="0" err="1" smtClean="0"/>
-              <a:t>ArtsyBee</a:t>
-            </a:r>
-            <a:endParaRPr lang="en-US" b="1" dirty="0" smtClean="0"/>
-          </a:p>
-          <a:p>
-            <a:pPr marL="0" indent="0">
-              <a:buNone/>
-            </a:pPr>
-            <a:r>
-              <a:rPr lang="en-US" dirty="0"/>
-              <a:t>I create these images with love and like to share them with you. My passion is to provide vintage designs to honor those artists that created something great and timeless. You are most welcome to use it for commercial projects, no need to ask for permission. I only ask that you not resell my images AS IS or claim them as your own creation. As always, a BIG thank you for the coffee donations I received, every dollar is a blessing for my family.</a:t>
-            </a:r>
-            <a:endParaRPr lang="en-US" b="1" dirty="0" smtClean="0"/>
-          </a:p>
-          <a:p>
-            <a:pPr marL="0" indent="0">
-              <a:buNone/>
-            </a:pPr>
-            <a:r>
-              <a:rPr lang="en-US" b="1" dirty="0" smtClean="0"/>
-              <a:t>Education </a:t>
-            </a:r>
-            <a:r>
-              <a:rPr lang="en-US" b="1" dirty="0"/>
-              <a:t>Online School royalty-free stock illustration. Free for use &amp; download</a:t>
-            </a:r>
-            <a:r>
-              <a:rPr lang="en-US" b="1" dirty="0" smtClean="0"/>
-              <a:t>.</a:t>
-            </a:r>
-          </a:p>
-          <a:p>
-            <a:pPr marL="0" indent="0">
-              <a:buNone/>
-            </a:pPr>
-            <a:r>
-              <a:rPr lang="en-US" b="1" dirty="0" smtClean="0"/>
-              <a:t>Content </a:t>
-            </a:r>
-            <a:r>
-              <a:rPr lang="en-US" b="1" dirty="0"/>
-              <a:t>License </a:t>
-            </a:r>
-            <a:r>
-              <a:rPr lang="en-US" b="1" dirty="0" smtClean="0"/>
-              <a:t>Summary</a:t>
-            </a:r>
-          </a:p>
-          <a:p>
-            <a:pPr marL="0" indent="0">
-              <a:buNone/>
-            </a:pPr>
-            <a:r>
-              <a:rPr lang="en-US" dirty="0"/>
-              <a:t>Welcome to </a:t>
-            </a:r>
-            <a:r>
-              <a:rPr lang="en-US" dirty="0" err="1"/>
-              <a:t>Pixabay</a:t>
-            </a:r>
-            <a:r>
-              <a:rPr lang="en-US" dirty="0"/>
-              <a:t>! </a:t>
-            </a:r>
-            <a:r>
-              <a:rPr lang="en-US" dirty="0" err="1"/>
-              <a:t>Pixabay</a:t>
-            </a:r>
-            <a:r>
-              <a:rPr lang="en-US" dirty="0"/>
-              <a:t> is a vibrant community of authors, artists and creators sharing royalty-free images, video, audio and other media. We refer to this collectively as “</a:t>
-            </a:r>
-            <a:r>
-              <a:rPr lang="en-US" b="1" dirty="0"/>
-              <a:t>Content</a:t>
-            </a:r>
-            <a:r>
-              <a:rPr lang="en-US" dirty="0"/>
-              <a:t>”. By accessing and using Content, or by contributing Content, you agree to comply with our Content License. </a:t>
-            </a:r>
-            <a:br>
-              <a:rPr lang="en-US" dirty="0"/>
-            </a:br>
-            <a:r>
-              <a:rPr lang="en-US" dirty="0"/>
-              <a:t/>
-            </a:r>
-            <a:br>
-              <a:rPr lang="en-US" dirty="0"/>
-            </a:br>
-            <a:r>
-              <a:rPr lang="en-US" dirty="0"/>
-              <a:t>At </a:t>
-            </a:r>
-            <a:r>
-              <a:rPr lang="en-US" dirty="0" err="1"/>
-              <a:t>Pixabay</a:t>
-            </a:r>
-            <a:r>
-              <a:rPr lang="en-US" dirty="0"/>
-              <a:t>, we like to keep things as simple as possible. For this reason, we have created this short summary of our Content License which is available in full </a:t>
-            </a:r>
-            <a:r>
-              <a:rPr lang="en-US" dirty="0">
-                <a:hlinkClick r:id="rId3"/>
-              </a:rPr>
-              <a:t>here</a:t>
-            </a:r>
-            <a:r>
-              <a:rPr lang="en-US" dirty="0"/>
-              <a:t>. Please keep in mind that only the full Content License is legally binding</a:t>
-            </a:r>
-            <a:r>
-              <a:rPr lang="en-US" dirty="0" smtClean="0"/>
-              <a:t>.</a:t>
-            </a:r>
-          </a:p>
-          <a:p>
-            <a:pPr marL="0" indent="0">
-              <a:buNone/>
-            </a:pPr>
-            <a:r>
-              <a:rPr lang="en-US" b="1" dirty="0"/>
-              <a:t>What are you allowed to do with Content?</a:t>
-            </a:r>
-          </a:p>
-          <a:p>
-            <a:r>
-              <a:rPr lang="en-US" dirty="0"/>
-              <a:t>Subject to the Prohibited Uses (see below), the Content License allows users to:</a:t>
-            </a:r>
-          </a:p>
-          <a:p>
-            <a:r>
-              <a:rPr lang="en-US" dirty="0"/>
-              <a:t>Use Content for free</a:t>
-            </a:r>
-          </a:p>
-          <a:p>
-            <a:r>
-              <a:rPr lang="en-US" dirty="0"/>
-              <a:t>Use Content without having to attribute the author (although giving credit is always appreciated by our community!)</a:t>
-            </a:r>
-          </a:p>
-          <a:p>
-            <a:r>
-              <a:rPr lang="en-US" dirty="0"/>
-              <a:t>Modify or adapt Content into new works</a:t>
-            </a:r>
-          </a:p>
-          <a:p>
-            <a:pPr marL="0" indent="0">
-              <a:buNone/>
-            </a:pPr>
-            <a:r>
-              <a:rPr lang="en-US" b="1" dirty="0"/>
-              <a:t>What are you not allowed to do with Content?</a:t>
-            </a:r>
-          </a:p>
-          <a:p>
-            <a:pPr marL="0" indent="0">
-              <a:buNone/>
-            </a:pPr>
-            <a:r>
-              <a:rPr lang="en-US" dirty="0"/>
-              <a:t>We refer to these as Prohibited Uses which include:</a:t>
-            </a:r>
-          </a:p>
-          <a:p>
-            <a:r>
-              <a:rPr lang="en-US" dirty="0"/>
-              <a:t>You cannot sell or distribute Content (either in digital or physical form) on a Standalone basis. Standalone means where no creative effort has been applied to the Content and it remains in substantially the same form as it exists on our website.</a:t>
-            </a:r>
-          </a:p>
-          <a:p>
-            <a:r>
-              <a:rPr lang="en-US" dirty="0"/>
-              <a:t>If Content contains any </a:t>
-            </a:r>
-            <a:r>
-              <a:rPr lang="en-US" dirty="0" err="1"/>
-              <a:t>recognisable</a:t>
-            </a:r>
-            <a:r>
-              <a:rPr lang="en-US" dirty="0"/>
-              <a:t> trademarks, logos or brands, you cannot use that Content for commercial purposes in relation to goods and services. In particular, you cannot print that Content on merchandise or other physical products for sale.</a:t>
-            </a:r>
-          </a:p>
-          <a:p>
-            <a:r>
-              <a:rPr lang="en-US" dirty="0"/>
-              <a:t>You cannot use Content in any immoral or illegal way, especially Content which features </a:t>
-            </a:r>
-            <a:r>
-              <a:rPr lang="en-US" dirty="0" err="1"/>
-              <a:t>recognisable</a:t>
-            </a:r>
-            <a:r>
-              <a:rPr lang="en-US" dirty="0"/>
-              <a:t> people.</a:t>
-            </a:r>
-          </a:p>
-          <a:p>
-            <a:r>
-              <a:rPr lang="en-US" dirty="0"/>
-              <a:t>You cannot use Content in a misleading or deceptive way.</a:t>
-            </a:r>
-          </a:p>
-          <a:p>
-            <a:r>
-              <a:rPr lang="en-US" dirty="0"/>
-              <a:t>Please be aware that certain Content may be subject to additional intellectual property rights (such as copyrights, trademarks, design rights), moral rights, proprietary rights, property rights, privacy rights or similar. It is your responsibility to check whether you require the consent of a third party or a license to use Content.</a:t>
-            </a:r>
-          </a:p>
-          <a:p>
-            <a:pPr marL="0" indent="0">
-              <a:buNone/>
-            </a:pPr>
-            <a:endParaRPr lang="en-US" dirty="0"/>
-          </a:p>
-        </p:txBody>
-      </p:sp>
-      <p:pic>
-        <p:nvPicPr>
-          <p:cNvPr id="4" name="Picture 3"/>
-          <p:cNvPicPr>
-            <a:picLocks noChangeAspect="1"/>
-          </p:cNvPicPr>
-          <p:nvPr/>
-        </p:nvPicPr>
-        <p:blipFill>
-          <a:blip r:embed="rId4" cstate="print">
-            <a:extLst>
-              <a:ext uri="{28A0092B-C50C-407E-A947-70E740481C1C}">
-                <a14:useLocalDpi xmlns:a14="http://schemas.microsoft.com/office/drawing/2010/main" val="0"/>
-              </a:ext>
-            </a:extLst>
-          </a:blip>
-          <a:stretch>
-            <a:fillRect/>
-          </a:stretch>
-        </p:blipFill>
-        <p:spPr>
-          <a:xfrm>
-            <a:off x="3538513" y="423662"/>
-            <a:ext cx="1578433" cy="1208488"/>
-          </a:xfrm>
-          <a:prstGeom prst="rect">
-            <a:avLst/>
-          </a:prstGeom>
-        </p:spPr>
-      </p:pic>
-    </p:spTree>
-    <p:extLst>
-      <p:ext uri="{BB962C8B-B14F-4D97-AF65-F5344CB8AC3E}">
-        <p14:creationId xmlns:p14="http://schemas.microsoft.com/office/powerpoint/2010/main" val="1820999432"/>
-      </p:ext>
-    </p:extLst>
-  </p:cSld>
-  <p:clrMapOvr>
-    <a:masterClrMapping/>
-  </p:clrMapOvr>
 </p:sld>
 </file>
 

</xml_diff>

<commit_message>
Added news article about the eFMI tutorial at the upcoming Modelica conference.
</commit_message>
<xml_diff>
--- a/static/media/news/2023-09-11.pptx
+++ b/static/media/news/2023-09-11.pptx
@@ -13,16 +13,16 @@
   <p:notesSz cx="6858000" cy="9144000"/>
   <p:embeddedFontLst>
     <p:embeddedFont>
-      <p:font typeface="Calibri Light" panose="020F0302020204030204" pitchFamily="34" charset="0"/>
+      <p:font typeface="Calibri" panose="020F0502020204030204" pitchFamily="34" charset="0"/>
       <p:regular r:id="rId5"/>
-      <p:italic r:id="rId6"/>
+      <p:bold r:id="rId6"/>
+      <p:italic r:id="rId7"/>
+      <p:boldItalic r:id="rId8"/>
     </p:embeddedFont>
     <p:embeddedFont>
-      <p:font typeface="Calibri" panose="020F0502020204030204" pitchFamily="34" charset="0"/>
-      <p:regular r:id="rId7"/>
-      <p:bold r:id="rId8"/>
-      <p:italic r:id="rId9"/>
-      <p:boldItalic r:id="rId10"/>
+      <p:font typeface="Calibri Light" panose="020F0302020204030204" pitchFamily="34" charset="0"/>
+      <p:regular r:id="rId9"/>
+      <p:italic r:id="rId10"/>
     </p:embeddedFont>
   </p:embeddedFontLst>
   <p:defaultTextStyle>
@@ -170,10 +170,9 @@
           </a:lstStyle>
           <a:p>
             <a:r>
-              <a:rPr lang="en-US" smtClean="0"/>
+              <a:rPr lang="en-US"/>
               <a:t>Click to edit Master title style</a:t>
             </a:r>
-            <a:endParaRPr lang="en-US"/>
           </a:p>
         </p:txBody>
       </p:sp>
@@ -235,10 +234,9 @@
           </a:lstStyle>
           <a:p>
             <a:r>
-              <a:rPr lang="en-US" smtClean="0"/>
+              <a:rPr lang="en-US"/>
               <a:t>Click to edit Master subtitle style</a:t>
             </a:r>
-            <a:endParaRPr lang="en-US"/>
           </a:p>
         </p:txBody>
       </p:sp>
@@ -259,7 +257,7 @@
           <a:p>
             <a:fld id="{076171DA-D5DD-486B-A5F5-158E752AA603}" type="datetimeFigureOut">
               <a:rPr lang="en-US" smtClean="0"/>
-              <a:t>9/14/2023</a:t>
+              <a:t>7/4/2025</a:t>
             </a:fld>
             <a:endParaRPr lang="en-US"/>
           </a:p>
@@ -353,10 +351,9 @@
           <a:lstStyle/>
           <a:p>
             <a:r>
-              <a:rPr lang="en-US" smtClean="0"/>
+              <a:rPr lang="en-US"/>
               <a:t>Click to edit Master title style</a:t>
             </a:r>
-            <a:endParaRPr lang="en-US"/>
           </a:p>
         </p:txBody>
       </p:sp>
@@ -377,38 +374,37 @@
           <a:p>
             <a:pPr lvl="0"/>
             <a:r>
-              <a:rPr lang="en-US" smtClean="0"/>
+              <a:rPr lang="en-US"/>
               <a:t>Edit Master text styles</a:t>
             </a:r>
           </a:p>
           <a:p>
             <a:pPr lvl="1"/>
             <a:r>
-              <a:rPr lang="en-US" smtClean="0"/>
+              <a:rPr lang="en-US"/>
               <a:t>Second level</a:t>
             </a:r>
           </a:p>
           <a:p>
             <a:pPr lvl="2"/>
             <a:r>
-              <a:rPr lang="en-US" smtClean="0"/>
+              <a:rPr lang="en-US"/>
               <a:t>Third level</a:t>
             </a:r>
           </a:p>
           <a:p>
             <a:pPr lvl="3"/>
             <a:r>
-              <a:rPr lang="en-US" smtClean="0"/>
+              <a:rPr lang="en-US"/>
               <a:t>Fourth level</a:t>
             </a:r>
           </a:p>
           <a:p>
             <a:pPr lvl="4"/>
             <a:r>
-              <a:rPr lang="en-US" smtClean="0"/>
+              <a:rPr lang="en-US"/>
               <a:t>Fifth level</a:t>
             </a:r>
-            <a:endParaRPr lang="en-US"/>
           </a:p>
         </p:txBody>
       </p:sp>
@@ -429,7 +425,7 @@
           <a:p>
             <a:fld id="{076171DA-D5DD-486B-A5F5-158E752AA603}" type="datetimeFigureOut">
               <a:rPr lang="en-US" smtClean="0"/>
-              <a:t>9/14/2023</a:t>
+              <a:t>7/4/2025</a:t>
             </a:fld>
             <a:endParaRPr lang="en-US"/>
           </a:p>
@@ -528,10 +524,9 @@
           <a:lstStyle/>
           <a:p>
             <a:r>
-              <a:rPr lang="en-US" smtClean="0"/>
+              <a:rPr lang="en-US"/>
               <a:t>Click to edit Master title style</a:t>
             </a:r>
-            <a:endParaRPr lang="en-US"/>
           </a:p>
         </p:txBody>
       </p:sp>
@@ -557,38 +552,37 @@
           <a:p>
             <a:pPr lvl="0"/>
             <a:r>
-              <a:rPr lang="en-US" smtClean="0"/>
+              <a:rPr lang="en-US"/>
               <a:t>Edit Master text styles</a:t>
             </a:r>
           </a:p>
           <a:p>
             <a:pPr lvl="1"/>
             <a:r>
-              <a:rPr lang="en-US" smtClean="0"/>
+              <a:rPr lang="en-US"/>
               <a:t>Second level</a:t>
             </a:r>
           </a:p>
           <a:p>
             <a:pPr lvl="2"/>
             <a:r>
-              <a:rPr lang="en-US" smtClean="0"/>
+              <a:rPr lang="en-US"/>
               <a:t>Third level</a:t>
             </a:r>
           </a:p>
           <a:p>
             <a:pPr lvl="3"/>
             <a:r>
-              <a:rPr lang="en-US" smtClean="0"/>
+              <a:rPr lang="en-US"/>
               <a:t>Fourth level</a:t>
             </a:r>
           </a:p>
           <a:p>
             <a:pPr lvl="4"/>
             <a:r>
-              <a:rPr lang="en-US" smtClean="0"/>
+              <a:rPr lang="en-US"/>
               <a:t>Fifth level</a:t>
             </a:r>
-            <a:endParaRPr lang="en-US"/>
           </a:p>
         </p:txBody>
       </p:sp>
@@ -609,7 +603,7 @@
           <a:p>
             <a:fld id="{076171DA-D5DD-486B-A5F5-158E752AA603}" type="datetimeFigureOut">
               <a:rPr lang="en-US" smtClean="0"/>
-              <a:t>9/14/2023</a:t>
+              <a:t>7/4/2025</a:t>
             </a:fld>
             <a:endParaRPr lang="en-US"/>
           </a:p>
@@ -703,10 +697,9 @@
           <a:lstStyle/>
           <a:p>
             <a:r>
-              <a:rPr lang="en-US" smtClean="0"/>
+              <a:rPr lang="en-US"/>
               <a:t>Click to edit Master title style</a:t>
             </a:r>
-            <a:endParaRPr lang="en-US"/>
           </a:p>
         </p:txBody>
       </p:sp>
@@ -727,38 +720,37 @@
           <a:p>
             <a:pPr lvl="0"/>
             <a:r>
-              <a:rPr lang="en-US" smtClean="0"/>
+              <a:rPr lang="en-US"/>
               <a:t>Edit Master text styles</a:t>
             </a:r>
           </a:p>
           <a:p>
             <a:pPr lvl="1"/>
             <a:r>
-              <a:rPr lang="en-US" smtClean="0"/>
+              <a:rPr lang="en-US"/>
               <a:t>Second level</a:t>
             </a:r>
           </a:p>
           <a:p>
             <a:pPr lvl="2"/>
             <a:r>
-              <a:rPr lang="en-US" smtClean="0"/>
+              <a:rPr lang="en-US"/>
               <a:t>Third level</a:t>
             </a:r>
           </a:p>
           <a:p>
             <a:pPr lvl="3"/>
             <a:r>
-              <a:rPr lang="en-US" smtClean="0"/>
+              <a:rPr lang="en-US"/>
               <a:t>Fourth level</a:t>
             </a:r>
           </a:p>
           <a:p>
             <a:pPr lvl="4"/>
             <a:r>
-              <a:rPr lang="en-US" smtClean="0"/>
+              <a:rPr lang="en-US"/>
               <a:t>Fifth level</a:t>
             </a:r>
-            <a:endParaRPr lang="en-US"/>
           </a:p>
         </p:txBody>
       </p:sp>
@@ -779,7 +771,7 @@
           <a:p>
             <a:fld id="{076171DA-D5DD-486B-A5F5-158E752AA603}" type="datetimeFigureOut">
               <a:rPr lang="en-US" smtClean="0"/>
-              <a:t>9/14/2023</a:t>
+              <a:t>7/4/2025</a:t>
             </a:fld>
             <a:endParaRPr lang="en-US"/>
           </a:p>
@@ -882,10 +874,9 @@
           </a:lstStyle>
           <a:p>
             <a:r>
-              <a:rPr lang="en-US" smtClean="0"/>
+              <a:rPr lang="en-US"/>
               <a:t>Click to edit Master title style</a:t>
             </a:r>
-            <a:endParaRPr lang="en-US"/>
           </a:p>
         </p:txBody>
       </p:sp>
@@ -1002,7 +993,7 @@
           <a:p>
             <a:pPr lvl="0"/>
             <a:r>
-              <a:rPr lang="en-US" smtClean="0"/>
+              <a:rPr lang="en-US"/>
               <a:t>Edit Master text styles</a:t>
             </a:r>
           </a:p>
@@ -1025,7 +1016,7 @@
           <a:p>
             <a:fld id="{076171DA-D5DD-486B-A5F5-158E752AA603}" type="datetimeFigureOut">
               <a:rPr lang="en-US" smtClean="0"/>
-              <a:t>9/14/2023</a:t>
+              <a:t>7/4/2025</a:t>
             </a:fld>
             <a:endParaRPr lang="en-US"/>
           </a:p>
@@ -1119,10 +1110,9 @@
           <a:lstStyle/>
           <a:p>
             <a:r>
-              <a:rPr lang="en-US" smtClean="0"/>
+              <a:rPr lang="en-US"/>
               <a:t>Click to edit Master title style</a:t>
             </a:r>
-            <a:endParaRPr lang="en-US"/>
           </a:p>
         </p:txBody>
       </p:sp>
@@ -1148,38 +1138,37 @@
           <a:p>
             <a:pPr lvl="0"/>
             <a:r>
-              <a:rPr lang="en-US" smtClean="0"/>
+              <a:rPr lang="en-US"/>
               <a:t>Edit Master text styles</a:t>
             </a:r>
           </a:p>
           <a:p>
             <a:pPr lvl="1"/>
             <a:r>
-              <a:rPr lang="en-US" smtClean="0"/>
+              <a:rPr lang="en-US"/>
               <a:t>Second level</a:t>
             </a:r>
           </a:p>
           <a:p>
             <a:pPr lvl="2"/>
             <a:r>
-              <a:rPr lang="en-US" smtClean="0"/>
+              <a:rPr lang="en-US"/>
               <a:t>Third level</a:t>
             </a:r>
           </a:p>
           <a:p>
             <a:pPr lvl="3"/>
             <a:r>
-              <a:rPr lang="en-US" smtClean="0"/>
+              <a:rPr lang="en-US"/>
               <a:t>Fourth level</a:t>
             </a:r>
           </a:p>
           <a:p>
             <a:pPr lvl="4"/>
             <a:r>
-              <a:rPr lang="en-US" smtClean="0"/>
+              <a:rPr lang="en-US"/>
               <a:t>Fifth level</a:t>
             </a:r>
-            <a:endParaRPr lang="en-US"/>
           </a:p>
         </p:txBody>
       </p:sp>
@@ -1205,38 +1194,37 @@
           <a:p>
             <a:pPr lvl="0"/>
             <a:r>
-              <a:rPr lang="en-US" smtClean="0"/>
+              <a:rPr lang="en-US"/>
               <a:t>Edit Master text styles</a:t>
             </a:r>
           </a:p>
           <a:p>
             <a:pPr lvl="1"/>
             <a:r>
-              <a:rPr lang="en-US" smtClean="0"/>
+              <a:rPr lang="en-US"/>
               <a:t>Second level</a:t>
             </a:r>
           </a:p>
           <a:p>
             <a:pPr lvl="2"/>
             <a:r>
-              <a:rPr lang="en-US" smtClean="0"/>
+              <a:rPr lang="en-US"/>
               <a:t>Third level</a:t>
             </a:r>
           </a:p>
           <a:p>
             <a:pPr lvl="3"/>
             <a:r>
-              <a:rPr lang="en-US" smtClean="0"/>
+              <a:rPr lang="en-US"/>
               <a:t>Fourth level</a:t>
             </a:r>
           </a:p>
           <a:p>
             <a:pPr lvl="4"/>
             <a:r>
-              <a:rPr lang="en-US" smtClean="0"/>
+              <a:rPr lang="en-US"/>
               <a:t>Fifth level</a:t>
             </a:r>
-            <a:endParaRPr lang="en-US"/>
           </a:p>
         </p:txBody>
       </p:sp>
@@ -1257,7 +1245,7 @@
           <a:p>
             <a:fld id="{076171DA-D5DD-486B-A5F5-158E752AA603}" type="datetimeFigureOut">
               <a:rPr lang="en-US" smtClean="0"/>
-              <a:t>9/14/2023</a:t>
+              <a:t>7/4/2025</a:t>
             </a:fld>
             <a:endParaRPr lang="en-US"/>
           </a:p>
@@ -1356,10 +1344,9 @@
           <a:lstStyle/>
           <a:p>
             <a:r>
-              <a:rPr lang="en-US" smtClean="0"/>
+              <a:rPr lang="en-US"/>
               <a:t>Click to edit Master title style</a:t>
             </a:r>
-            <a:endParaRPr lang="en-US"/>
           </a:p>
         </p:txBody>
       </p:sp>
@@ -1422,7 +1409,7 @@
           <a:p>
             <a:pPr lvl="0"/>
             <a:r>
-              <a:rPr lang="en-US" smtClean="0"/>
+              <a:rPr lang="en-US"/>
               <a:t>Edit Master text styles</a:t>
             </a:r>
           </a:p>
@@ -1450,38 +1437,37 @@
           <a:p>
             <a:pPr lvl="0"/>
             <a:r>
-              <a:rPr lang="en-US" smtClean="0"/>
+              <a:rPr lang="en-US"/>
               <a:t>Edit Master text styles</a:t>
             </a:r>
           </a:p>
           <a:p>
             <a:pPr lvl="1"/>
             <a:r>
-              <a:rPr lang="en-US" smtClean="0"/>
+              <a:rPr lang="en-US"/>
               <a:t>Second level</a:t>
             </a:r>
           </a:p>
           <a:p>
             <a:pPr lvl="2"/>
             <a:r>
-              <a:rPr lang="en-US" smtClean="0"/>
+              <a:rPr lang="en-US"/>
               <a:t>Third level</a:t>
             </a:r>
           </a:p>
           <a:p>
             <a:pPr lvl="3"/>
             <a:r>
-              <a:rPr lang="en-US" smtClean="0"/>
+              <a:rPr lang="en-US"/>
               <a:t>Fourth level</a:t>
             </a:r>
           </a:p>
           <a:p>
             <a:pPr lvl="4"/>
             <a:r>
-              <a:rPr lang="en-US" smtClean="0"/>
+              <a:rPr lang="en-US"/>
               <a:t>Fifth level</a:t>
             </a:r>
-            <a:endParaRPr lang="en-US"/>
           </a:p>
         </p:txBody>
       </p:sp>
@@ -1544,7 +1530,7 @@
           <a:p>
             <a:pPr lvl="0"/>
             <a:r>
-              <a:rPr lang="en-US" smtClean="0"/>
+              <a:rPr lang="en-US"/>
               <a:t>Edit Master text styles</a:t>
             </a:r>
           </a:p>
@@ -1572,38 +1558,37 @@
           <a:p>
             <a:pPr lvl="0"/>
             <a:r>
-              <a:rPr lang="en-US" smtClean="0"/>
+              <a:rPr lang="en-US"/>
               <a:t>Edit Master text styles</a:t>
             </a:r>
           </a:p>
           <a:p>
             <a:pPr lvl="1"/>
             <a:r>
-              <a:rPr lang="en-US" smtClean="0"/>
+              <a:rPr lang="en-US"/>
               <a:t>Second level</a:t>
             </a:r>
           </a:p>
           <a:p>
             <a:pPr lvl="2"/>
             <a:r>
-              <a:rPr lang="en-US" smtClean="0"/>
+              <a:rPr lang="en-US"/>
               <a:t>Third level</a:t>
             </a:r>
           </a:p>
           <a:p>
             <a:pPr lvl="3"/>
             <a:r>
-              <a:rPr lang="en-US" smtClean="0"/>
+              <a:rPr lang="en-US"/>
               <a:t>Fourth level</a:t>
             </a:r>
           </a:p>
           <a:p>
             <a:pPr lvl="4"/>
             <a:r>
-              <a:rPr lang="en-US" smtClean="0"/>
+              <a:rPr lang="en-US"/>
               <a:t>Fifth level</a:t>
             </a:r>
-            <a:endParaRPr lang="en-US"/>
           </a:p>
         </p:txBody>
       </p:sp>
@@ -1624,7 +1609,7 @@
           <a:p>
             <a:fld id="{076171DA-D5DD-486B-A5F5-158E752AA603}" type="datetimeFigureOut">
               <a:rPr lang="en-US" smtClean="0"/>
-              <a:t>9/14/2023</a:t>
+              <a:t>7/4/2025</a:t>
             </a:fld>
             <a:endParaRPr lang="en-US"/>
           </a:p>
@@ -1718,10 +1703,9 @@
           <a:lstStyle/>
           <a:p>
             <a:r>
-              <a:rPr lang="en-US" smtClean="0"/>
+              <a:rPr lang="en-US"/>
               <a:t>Click to edit Master title style</a:t>
             </a:r>
-            <a:endParaRPr lang="en-US"/>
           </a:p>
         </p:txBody>
       </p:sp>
@@ -1742,7 +1726,7 @@
           <a:p>
             <a:fld id="{076171DA-D5DD-486B-A5F5-158E752AA603}" type="datetimeFigureOut">
               <a:rPr lang="en-US" smtClean="0"/>
-              <a:t>9/14/2023</a:t>
+              <a:t>7/4/2025</a:t>
             </a:fld>
             <a:endParaRPr lang="en-US"/>
           </a:p>
@@ -1837,7 +1821,7 @@
           <a:p>
             <a:fld id="{076171DA-D5DD-486B-A5F5-158E752AA603}" type="datetimeFigureOut">
               <a:rPr lang="en-US" smtClean="0"/>
-              <a:t>9/14/2023</a:t>
+              <a:t>7/4/2025</a:t>
             </a:fld>
             <a:endParaRPr lang="en-US"/>
           </a:p>
@@ -1940,10 +1924,9 @@
           </a:lstStyle>
           <a:p>
             <a:r>
-              <a:rPr lang="en-US" smtClean="0"/>
+              <a:rPr lang="en-US"/>
               <a:t>Click to edit Master title style</a:t>
             </a:r>
-            <a:endParaRPr lang="en-US"/>
           </a:p>
         </p:txBody>
       </p:sp>
@@ -1997,38 +1980,37 @@
           <a:p>
             <a:pPr lvl="0"/>
             <a:r>
-              <a:rPr lang="en-US" smtClean="0"/>
+              <a:rPr lang="en-US"/>
               <a:t>Edit Master text styles</a:t>
             </a:r>
           </a:p>
           <a:p>
             <a:pPr lvl="1"/>
             <a:r>
-              <a:rPr lang="en-US" smtClean="0"/>
+              <a:rPr lang="en-US"/>
               <a:t>Second level</a:t>
             </a:r>
           </a:p>
           <a:p>
             <a:pPr lvl="2"/>
             <a:r>
-              <a:rPr lang="en-US" smtClean="0"/>
+              <a:rPr lang="en-US"/>
               <a:t>Third level</a:t>
             </a:r>
           </a:p>
           <a:p>
             <a:pPr lvl="3"/>
             <a:r>
-              <a:rPr lang="en-US" smtClean="0"/>
+              <a:rPr lang="en-US"/>
               <a:t>Fourth level</a:t>
             </a:r>
           </a:p>
           <a:p>
             <a:pPr lvl="4"/>
             <a:r>
-              <a:rPr lang="en-US" smtClean="0"/>
+              <a:rPr lang="en-US"/>
               <a:t>Fifth level</a:t>
             </a:r>
-            <a:endParaRPr lang="en-US"/>
           </a:p>
         </p:txBody>
       </p:sp>
@@ -2091,7 +2073,7 @@
           <a:p>
             <a:pPr lvl="0"/>
             <a:r>
-              <a:rPr lang="en-US" smtClean="0"/>
+              <a:rPr lang="en-US"/>
               <a:t>Edit Master text styles</a:t>
             </a:r>
           </a:p>
@@ -2114,7 +2096,7 @@
           <a:p>
             <a:fld id="{076171DA-D5DD-486B-A5F5-158E752AA603}" type="datetimeFigureOut">
               <a:rPr lang="en-US" smtClean="0"/>
-              <a:t>9/14/2023</a:t>
+              <a:t>7/4/2025</a:t>
             </a:fld>
             <a:endParaRPr lang="en-US"/>
           </a:p>
@@ -2217,10 +2199,9 @@
           </a:lstStyle>
           <a:p>
             <a:r>
-              <a:rPr lang="en-US" smtClean="0"/>
+              <a:rPr lang="en-US"/>
               <a:t>Click to edit Master title style</a:t>
             </a:r>
-            <a:endParaRPr lang="en-US"/>
           </a:p>
         </p:txBody>
       </p:sp>
@@ -2344,7 +2325,7 @@
           <a:p>
             <a:pPr lvl="0"/>
             <a:r>
-              <a:rPr lang="en-US" smtClean="0"/>
+              <a:rPr lang="en-US"/>
               <a:t>Edit Master text styles</a:t>
             </a:r>
           </a:p>
@@ -2367,7 +2348,7 @@
           <a:p>
             <a:fld id="{076171DA-D5DD-486B-A5F5-158E752AA603}" type="datetimeFigureOut">
               <a:rPr lang="en-US" smtClean="0"/>
-              <a:t>9/14/2023</a:t>
+              <a:t>7/4/2025</a:t>
             </a:fld>
             <a:endParaRPr lang="en-US"/>
           </a:p>
@@ -2476,10 +2457,9 @@
           <a:lstStyle/>
           <a:p>
             <a:r>
-              <a:rPr lang="en-US" smtClean="0"/>
+              <a:rPr lang="en-US"/>
               <a:t>Click to edit Master title style</a:t>
             </a:r>
-            <a:endParaRPr lang="en-US"/>
           </a:p>
         </p:txBody>
       </p:sp>
@@ -2510,38 +2490,37 @@
           <a:p>
             <a:pPr lvl="0"/>
             <a:r>
-              <a:rPr lang="en-US" smtClean="0"/>
+              <a:rPr lang="en-US"/>
               <a:t>Edit Master text styles</a:t>
             </a:r>
           </a:p>
           <a:p>
             <a:pPr lvl="1"/>
             <a:r>
-              <a:rPr lang="en-US" smtClean="0"/>
+              <a:rPr lang="en-US"/>
               <a:t>Second level</a:t>
             </a:r>
           </a:p>
           <a:p>
             <a:pPr lvl="2"/>
             <a:r>
-              <a:rPr lang="en-US" smtClean="0"/>
+              <a:rPr lang="en-US"/>
               <a:t>Third level</a:t>
             </a:r>
           </a:p>
           <a:p>
             <a:pPr lvl="3"/>
             <a:r>
-              <a:rPr lang="en-US" smtClean="0"/>
+              <a:rPr lang="en-US"/>
               <a:t>Fourth level</a:t>
             </a:r>
           </a:p>
           <a:p>
             <a:pPr lvl="4"/>
             <a:r>
-              <a:rPr lang="en-US" smtClean="0"/>
+              <a:rPr lang="en-US"/>
               <a:t>Fifth level</a:t>
             </a:r>
-            <a:endParaRPr lang="en-US"/>
           </a:p>
         </p:txBody>
       </p:sp>
@@ -2580,7 +2559,7 @@
           <a:p>
             <a:fld id="{076171DA-D5DD-486B-A5F5-158E752AA603}" type="datetimeFigureOut">
               <a:rPr lang="en-US" smtClean="0"/>
-              <a:t>9/14/2023</a:t>
+              <a:t>7/4/2025</a:t>
             </a:fld>
             <a:endParaRPr lang="en-US"/>
           </a:p>
@@ -3025,7 +3004,7 @@
               <a:defRPr/>
             </a:pPr>
             <a:r>
-              <a:rPr kumimoji="0" lang="en-US" sz="1800" b="0" i="0" u="none" strike="noStrike" kern="1200" cap="none" spc="0" normalizeH="0" baseline="0" noProof="0" dirty="0" smtClean="0">
+              <a:rPr kumimoji="0" lang="en-US" sz="1800" b="0" i="0" u="none" strike="noStrike" kern="1200" cap="none" spc="0" normalizeH="0" baseline="0" noProof="0" dirty="0">
                 <a:ln>
                   <a:noFill/>
                 </a:ln>
@@ -3039,24 +3018,7 @@
                 <a:ea typeface="+mn-ea"/>
                 <a:cs typeface="+mn-cs"/>
               </a:rPr>
-              <a:t>This </a:t>
-            </a:r>
-            <a:r>
-              <a:rPr kumimoji="0" lang="en-US" sz="1800" b="0" i="0" u="none" strike="noStrike" kern="1200" cap="none" spc="0" normalizeH="0" baseline="0" noProof="0" dirty="0">
-                <a:ln>
-                  <a:noFill/>
-                </a:ln>
-                <a:solidFill>
-                  <a:prstClr val="black"/>
-                </a:solidFill>
-                <a:effectLst/>
-                <a:uLnTx/>
-                <a:uFillTx/>
-                <a:latin typeface="Calibri" panose="020F0502020204030204"/>
-                <a:ea typeface="+mn-ea"/>
-                <a:cs typeface="+mn-cs"/>
-              </a:rPr>
-              <a:t>work is licensed under a </a:t>
+              <a:t>This work is licensed under a </a:t>
             </a:r>
             <a:r>
               <a:rPr kumimoji="0" lang="en-US" sz="1800" b="0" i="1" u="none" strike="noStrike" kern="1200" cap="none" spc="0" normalizeH="0" baseline="0" noProof="0" dirty="0">
@@ -3095,7 +3057,7 @@
               <a:t> license</a:t>
             </a:r>
             <a:r>
-              <a:rPr kumimoji="0" lang="en-US" sz="1800" b="0" i="0" u="none" strike="noStrike" kern="1200" cap="none" spc="0" normalizeH="0" baseline="0" noProof="0" dirty="0" smtClean="0">
+              <a:rPr kumimoji="0" lang="en-US" sz="1800" b="0" i="0" u="none" strike="noStrike" kern="1200" cap="none" spc="0" normalizeH="0" baseline="0" noProof="0" dirty="0">
                 <a:ln>
                   <a:noFill/>
                 </a:ln>
@@ -3228,24 +3190,7 @@
                 <a:ea typeface="+mn-ea"/>
                 <a:cs typeface="+mn-cs"/>
               </a:rPr>
-              <a:t>© </a:t>
-            </a:r>
-            <a:r>
-              <a:rPr kumimoji="0" lang="en-US" sz="1800" b="0" i="0" u="none" strike="noStrike" kern="1200" cap="none" spc="0" normalizeH="0" baseline="0" noProof="0" dirty="0" smtClean="0">
-                <a:ln>
-                  <a:noFill/>
-                </a:ln>
-                <a:solidFill>
-                  <a:prstClr val="black"/>
-                </a:solidFill>
-                <a:effectLst/>
-                <a:uLnTx/>
-                <a:uFillTx/>
-                <a:latin typeface="Calibri" panose="020F0502020204030204"/>
-                <a:ea typeface="+mn-ea"/>
-                <a:cs typeface="+mn-cs"/>
-              </a:rPr>
-              <a:t>2021-2023, </a:t>
+              <a:t>© 2021-2023, </a:t>
             </a:r>
             <a:r>
               <a:rPr kumimoji="0" lang="en-US" sz="1800" b="0" i="0" u="none" strike="noStrike" kern="1200" cap="none" spc="0" normalizeH="0" baseline="0" noProof="0" dirty="0">
@@ -3280,24 +3225,7 @@
                 <a:ea typeface="+mn-ea"/>
                 <a:cs typeface="+mn-cs"/>
               </a:rPr>
-              <a:t> and contributors</a:t>
-            </a:r>
-            <a:r>
-              <a:rPr kumimoji="0" lang="en-US" sz="1800" b="0" i="0" u="none" strike="noStrike" kern="1200" cap="none" spc="0" normalizeH="0" baseline="0" noProof="0" dirty="0" smtClean="0">
-                <a:ln>
-                  <a:noFill/>
-                </a:ln>
-                <a:solidFill>
-                  <a:prstClr val="black"/>
-                </a:solidFill>
-                <a:effectLst/>
-                <a:uLnTx/>
-                <a:uFillTx/>
-                <a:latin typeface="Calibri" panose="020F0502020204030204"/>
-                <a:ea typeface="+mn-ea"/>
-                <a:cs typeface="+mn-cs"/>
-              </a:rPr>
-              <a:t>.</a:t>
+              <a:t> and contributors.</a:t>
             </a:r>
           </a:p>
         </p:txBody>
@@ -3342,7 +3270,7 @@
               <a:defRPr/>
             </a:pPr>
             <a:r>
-              <a:rPr kumimoji="0" lang="en-US" sz="1800" b="0" i="0" u="none" strike="noStrike" kern="1200" cap="none" spc="0" normalizeH="0" baseline="0" noProof="0" dirty="0" smtClean="0">
+              <a:rPr kumimoji="0" lang="en-US" sz="1800" b="0" i="0" u="none" strike="noStrike" kern="1200" cap="none" spc="0" normalizeH="0" baseline="0" noProof="0" dirty="0">
                 <a:ln>
                   <a:noFill/>
                 </a:ln>
@@ -3356,24 +3284,7 @@
                 <a:ea typeface="+mn-ea"/>
                 <a:cs typeface="+mn-cs"/>
               </a:rPr>
-              <a:t>Modelica</a:t>
-            </a:r>
-            <a:r>
-              <a:rPr kumimoji="0" lang="en-US" sz="1800" b="0" i="0" u="none" strike="noStrike" kern="1200" cap="none" spc="0" normalizeH="0" baseline="0" noProof="0" dirty="0">
-                <a:ln>
-                  <a:noFill/>
-                </a:ln>
-                <a:solidFill>
-                  <a:prstClr val="black"/>
-                </a:solidFill>
-                <a:effectLst/>
-                <a:uLnTx/>
-                <a:uFillTx/>
-                <a:latin typeface="Calibri" panose="020F0502020204030204"/>
-                <a:ea typeface="+mn-ea"/>
-                <a:cs typeface="+mn-cs"/>
-              </a:rPr>
-              <a:t>® is a registered trademark of the Modelica Association.</a:t>
+              <a:t>Modelica® is a registered trademark of the Modelica Association.</a:t>
             </a:r>
           </a:p>
           <a:p>
@@ -3534,24 +3445,7 @@
                 <a:ea typeface="+mn-ea"/>
                 <a:cs typeface="+mn-cs"/>
               </a:rPr>
-              <a:t>DCP® is a registered trademark of the Modelica Association</a:t>
-            </a:r>
-            <a:r>
-              <a:rPr kumimoji="0" lang="en-US" sz="1800" b="0" i="0" u="none" strike="noStrike" kern="1200" cap="none" spc="0" normalizeH="0" baseline="0" noProof="0" dirty="0" smtClean="0">
-                <a:ln>
-                  <a:noFill/>
-                </a:ln>
-                <a:solidFill>
-                  <a:prstClr val="black"/>
-                </a:solidFill>
-                <a:effectLst/>
-                <a:uLnTx/>
-                <a:uFillTx/>
-                <a:latin typeface="Calibri" panose="020F0502020204030204"/>
-                <a:ea typeface="+mn-ea"/>
-                <a:cs typeface="+mn-cs"/>
-              </a:rPr>
-              <a:t>.</a:t>
+              <a:t>DCP® is a registered trademark of the Modelica Association.</a:t>
             </a:r>
           </a:p>
           <a:p>
@@ -3572,7 +3466,7 @@
               <a:tabLst/>
               <a:defRPr/>
             </a:pPr>
-            <a:endParaRPr kumimoji="0" lang="en-US" sz="1800" b="0" i="0" u="none" strike="noStrike" kern="1200" cap="none" spc="0" normalizeH="0" baseline="0" noProof="0" dirty="0" smtClean="0">
+            <a:endParaRPr kumimoji="0" lang="en-US" sz="1800" b="0" i="0" u="none" strike="noStrike" kern="1200" cap="none" spc="0" normalizeH="0" baseline="0" noProof="0" dirty="0">
               <a:ln>
                 <a:noFill/>
               </a:ln>
@@ -3606,7 +3500,7 @@
               <a:defRPr/>
             </a:pPr>
             <a:r>
-              <a:rPr kumimoji="0" lang="sv-SE" sz="1800" b="0" i="0" u="none" strike="noStrike" kern="1200" cap="none" spc="0" normalizeH="0" baseline="0" noProof="0" dirty="0" err="1" smtClean="0">
+              <a:rPr kumimoji="0" lang="sv-SE" sz="1800" b="0" i="0" u="none" strike="noStrike" kern="1200" cap="none" spc="0" normalizeH="0" baseline="0" noProof="0" dirty="0" err="1">
                 <a:ln>
                   <a:noFill/>
                 </a:ln>
@@ -3623,7 +3517,7 @@
               <a:t>Third</a:t>
             </a:r>
             <a:r>
-              <a:rPr kumimoji="0" lang="sv-SE" sz="1800" b="0" i="0" u="none" strike="noStrike" kern="1200" cap="none" spc="0" normalizeH="0" baseline="0" noProof="0" dirty="0" smtClean="0">
+              <a:rPr kumimoji="0" lang="sv-SE" sz="1800" b="0" i="0" u="none" strike="noStrike" kern="1200" cap="none" spc="0" normalizeH="0" baseline="0" noProof="0" dirty="0">
                 <a:ln>
                   <a:noFill/>
                 </a:ln>
@@ -3640,7 +3534,7 @@
               <a:t> party marks and brands </a:t>
             </a:r>
             <a:r>
-              <a:rPr kumimoji="0" lang="sv-SE" sz="1800" b="0" i="0" u="none" strike="noStrike" kern="1200" cap="none" spc="0" normalizeH="0" baseline="0" noProof="0" dirty="0" err="1" smtClean="0">
+              <a:rPr kumimoji="0" lang="sv-SE" sz="1800" b="0" i="0" u="none" strike="noStrike" kern="1200" cap="none" spc="0" normalizeH="0" baseline="0" noProof="0" dirty="0" err="1">
                 <a:ln>
                   <a:noFill/>
                 </a:ln>
@@ -3657,7 +3551,7 @@
               <a:t>are</a:t>
             </a:r>
             <a:r>
-              <a:rPr kumimoji="0" lang="sv-SE" sz="1800" b="0" i="0" u="none" strike="noStrike" kern="1200" cap="none" spc="0" normalizeH="0" baseline="0" noProof="0" dirty="0" smtClean="0">
+              <a:rPr kumimoji="0" lang="sv-SE" sz="1800" b="0" i="0" u="none" strike="noStrike" kern="1200" cap="none" spc="0" normalizeH="0" baseline="0" noProof="0" dirty="0">
                 <a:ln>
                   <a:noFill/>
                 </a:ln>
@@ -3674,7 +3568,7 @@
               <a:t> the </a:t>
             </a:r>
             <a:r>
-              <a:rPr kumimoji="0" lang="sv-SE" sz="1800" b="0" i="0" u="none" strike="noStrike" kern="1200" cap="none" spc="0" normalizeH="0" baseline="0" noProof="0" dirty="0" err="1" smtClean="0">
+              <a:rPr kumimoji="0" lang="sv-SE" sz="1800" b="0" i="0" u="none" strike="noStrike" kern="1200" cap="none" spc="0" normalizeH="0" baseline="0" noProof="0" dirty="0" err="1">
                 <a:ln>
                   <a:noFill/>
                 </a:ln>
@@ -3691,7 +3585,7 @@
               <a:t>property</a:t>
             </a:r>
             <a:r>
-              <a:rPr kumimoji="0" lang="sv-SE" sz="1800" b="0" i="0" u="none" strike="noStrike" kern="1200" cap="none" spc="0" normalizeH="0" baseline="0" noProof="0" dirty="0" smtClean="0">
+              <a:rPr kumimoji="0" lang="sv-SE" sz="1800" b="0" i="0" u="none" strike="noStrike" kern="1200" cap="none" spc="0" normalizeH="0" baseline="0" noProof="0" dirty="0">
                 <a:ln>
                   <a:noFill/>
                 </a:ln>
@@ -3708,7 +3602,7 @@
               <a:t> </a:t>
             </a:r>
             <a:r>
-              <a:rPr kumimoji="0" lang="sv-SE" sz="1800" b="0" i="0" u="none" strike="noStrike" kern="1200" cap="none" spc="0" normalizeH="0" baseline="0" noProof="0" dirty="0" err="1" smtClean="0">
+              <a:rPr kumimoji="0" lang="sv-SE" sz="1800" b="0" i="0" u="none" strike="noStrike" kern="1200" cap="none" spc="0" normalizeH="0" baseline="0" noProof="0" dirty="0" err="1">
                 <a:ln>
                   <a:noFill/>
                 </a:ln>
@@ -3725,7 +3619,7 @@
               <a:t>of</a:t>
             </a:r>
             <a:r>
-              <a:rPr kumimoji="0" lang="sv-SE" sz="1800" b="0" i="0" u="none" strike="noStrike" kern="1200" cap="none" spc="0" normalizeH="0" baseline="0" noProof="0" dirty="0" smtClean="0">
+              <a:rPr kumimoji="0" lang="sv-SE" sz="1800" b="0" i="0" u="none" strike="noStrike" kern="1200" cap="none" spc="0" normalizeH="0" baseline="0" noProof="0" dirty="0">
                 <a:ln>
                   <a:noFill/>
                 </a:ln>
@@ -3742,7 +3636,7 @@
               <a:t> </a:t>
             </a:r>
             <a:r>
-              <a:rPr kumimoji="0" lang="sv-SE" sz="1800" b="0" i="0" u="none" strike="noStrike" kern="1200" cap="none" spc="0" normalizeH="0" baseline="0" noProof="0" dirty="0" err="1" smtClean="0">
+              <a:rPr kumimoji="0" lang="sv-SE" sz="1800" b="0" i="0" u="none" strike="noStrike" kern="1200" cap="none" spc="0" normalizeH="0" baseline="0" noProof="0" dirty="0" err="1">
                 <a:ln>
                   <a:noFill/>
                 </a:ln>
@@ -3759,7 +3653,7 @@
               <a:t>their</a:t>
             </a:r>
             <a:r>
-              <a:rPr kumimoji="0" lang="sv-SE" sz="1800" b="0" i="0" u="none" strike="noStrike" kern="1200" cap="none" spc="0" normalizeH="0" baseline="0" noProof="0" dirty="0" smtClean="0">
+              <a:rPr kumimoji="0" lang="sv-SE" sz="1800" b="0" i="0" u="none" strike="noStrike" kern="1200" cap="none" spc="0" normalizeH="0" baseline="0" noProof="0" dirty="0">
                 <a:ln>
                   <a:noFill/>
                 </a:ln>
@@ -3776,7 +3670,7 @@
               <a:t> </a:t>
             </a:r>
             <a:r>
-              <a:rPr kumimoji="0" lang="sv-SE" sz="1800" b="0" i="0" u="none" strike="noStrike" kern="1200" cap="none" spc="0" normalizeH="0" baseline="0" noProof="0" dirty="0" err="1" smtClean="0">
+              <a:rPr kumimoji="0" lang="sv-SE" sz="1800" b="0" i="0" u="none" strike="noStrike" kern="1200" cap="none" spc="0" normalizeH="0" baseline="0" noProof="0" dirty="0" err="1">
                 <a:ln>
                   <a:noFill/>
                 </a:ln>
@@ -3793,7 +3687,7 @@
               <a:t>respective</a:t>
             </a:r>
             <a:r>
-              <a:rPr kumimoji="0" lang="sv-SE" sz="1800" b="0" i="0" u="none" strike="noStrike" kern="1200" cap="none" spc="0" normalizeH="0" baseline="0" noProof="0" dirty="0" smtClean="0">
+              <a:rPr kumimoji="0" lang="sv-SE" sz="1800" b="0" i="0" u="none" strike="noStrike" kern="1200" cap="none" spc="0" normalizeH="0" baseline="0" noProof="0" dirty="0">
                 <a:ln>
                   <a:noFill/>
                 </a:ln>
@@ -3810,7 +3704,7 @@
               <a:t> </a:t>
             </a:r>
             <a:r>
-              <a:rPr kumimoji="0" lang="sv-SE" sz="1800" b="0" i="0" u="none" strike="noStrike" kern="1200" cap="none" spc="0" normalizeH="0" baseline="0" noProof="0" dirty="0" err="1" smtClean="0">
+              <a:rPr kumimoji="0" lang="sv-SE" sz="1800" b="0" i="0" u="none" strike="noStrike" kern="1200" cap="none" spc="0" normalizeH="0" baseline="0" noProof="0" dirty="0" err="1">
                 <a:ln>
                   <a:noFill/>
                 </a:ln>
@@ -3827,7 +3721,7 @@
               <a:t>holders</a:t>
             </a:r>
             <a:r>
-              <a:rPr kumimoji="0" lang="sv-SE" sz="1800" b="0" i="0" u="none" strike="noStrike" kern="1200" cap="none" spc="0" normalizeH="0" baseline="0" noProof="0" dirty="0" smtClean="0">
+              <a:rPr kumimoji="0" lang="sv-SE" sz="1800" b="0" i="0" u="none" strike="noStrike" kern="1200" cap="none" spc="0" normalizeH="0" baseline="0" noProof="0" dirty="0">
                 <a:ln>
                   <a:noFill/>
                 </a:ln>
@@ -3856,13 +3750,6 @@
   <p:clrMapOvr>
     <a:masterClrMapping/>
   </p:clrMapOvr>
-  <p:timing>
-    <p:tnLst>
-      <p:par>
-        <p:cTn id="1" dur="indefinite" restart="never" nodeType="tmRoot"/>
-      </p:par>
-    </p:tnLst>
-  </p:timing>
 </p:sld>
 </file>
 
@@ -3899,11 +3786,11 @@
           <a:lstStyle/>
           <a:p>
             <a:r>
-              <a:rPr lang="sv-SE" dirty="0" err="1" smtClean="0"/>
+              <a:rPr lang="sv-SE" dirty="0" err="1"/>
               <a:t>License</a:t>
             </a:r>
             <a:r>
-              <a:rPr lang="sv-SE" dirty="0" smtClean="0"/>
+              <a:rPr lang="sv-SE" dirty="0"/>
               <a:t> for</a:t>
             </a:r>
             <a:endParaRPr lang="en-US" dirty="0"/>
@@ -3934,37 +3821,27 @@
               <a:rPr lang="en-US" b="1" dirty="0">
                 <a:hlinkClick r:id="rId2"/>
               </a:rPr>
-              <a:t>https://pixabay.com/illustrations/education-online-school-elearning-5307517</a:t>
-            </a:r>
-            <a:r>
-              <a:rPr lang="en-US" b="1" dirty="0" smtClean="0">
-                <a:hlinkClick r:id="rId2"/>
-              </a:rPr>
-              <a:t>/</a:t>
-            </a:r>
-            <a:endParaRPr lang="en-US" b="1" dirty="0" smtClean="0"/>
+              <a:t>https://pixabay.com/illustrations/education-online-school-elearning-5307517/</a:t>
+            </a:r>
+            <a:endParaRPr lang="en-US" b="1" dirty="0"/>
           </a:p>
           <a:p>
             <a:pPr marL="0" indent="0">
               <a:buNone/>
             </a:pPr>
             <a:r>
-              <a:rPr lang="en-US" dirty="0" smtClean="0"/>
+              <a:rPr lang="en-US" dirty="0"/>
               <a:t>©</a:t>
             </a:r>
             <a:r>
               <a:rPr lang="sv-SE" b="1" dirty="0"/>
-              <a:t> June 17, </a:t>
-            </a:r>
-            <a:r>
-              <a:rPr lang="sv-SE" b="1" dirty="0" smtClean="0"/>
-              <a:t>2020 by </a:t>
-            </a:r>
-            <a:r>
-              <a:rPr lang="en-US" b="1" dirty="0" err="1" smtClean="0"/>
+              <a:t> June 17, 2020 by </a:t>
+            </a:r>
+            <a:r>
+              <a:rPr lang="en-US" b="1" dirty="0" err="1"/>
               <a:t>ArtsyBee</a:t>
             </a:r>
-            <a:endParaRPr lang="en-US" b="1" dirty="0" smtClean="0"/>
+            <a:endParaRPr lang="en-US" b="1" dirty="0"/>
           </a:p>
           <a:p>
             <a:pPr marL="0" indent="0">
@@ -3974,23 +3851,15 @@
               <a:rPr lang="en-US" dirty="0"/>
               <a:t>I create these images with love and like to share them with you. My passion is to provide vintage designs to honor those artists that created something great and timeless. You are most welcome to use it for commercial projects, no need to ask for permission. I only ask that you not resell my images AS IS or claim them as your own creation. As always, a BIG thank you for the coffee donations I received, every dollar is a blessing for my family.</a:t>
             </a:r>
-            <a:endParaRPr lang="en-US" b="1" dirty="0" smtClean="0"/>
+            <a:endParaRPr lang="en-US" b="1" dirty="0"/>
           </a:p>
           <a:p>
             <a:pPr marL="0" indent="0">
               <a:buNone/>
             </a:pPr>
             <a:r>
-              <a:rPr lang="en-US" b="1" dirty="0" smtClean="0"/>
-              <a:t>Education </a:t>
-            </a:r>
-            <a:r>
               <a:rPr lang="en-US" b="1" dirty="0"/>
-              <a:t>Online School royalty-free stock illustration. Free for use &amp; download</a:t>
-            </a:r>
-            <a:r>
-              <a:rPr lang="en-US" b="1" dirty="0" smtClean="0"/>
-              <a:t>.</a:t>
+              <a:t>Education Online School royalty-free stock illustration. Free for use &amp; download.</a:t>
             </a:r>
           </a:p>
           <a:p>
@@ -3998,16 +3867,8 @@
               <a:buNone/>
             </a:pPr>
             <a:r>
-              <a:rPr lang="en-US" b="1" dirty="0" smtClean="0"/>
-              <a:t>Content </a:t>
-            </a:r>
-            <a:r>
               <a:rPr lang="en-US" b="1" dirty="0"/>
-              <a:t>License </a:t>
-            </a:r>
-            <a:r>
-              <a:rPr lang="en-US" b="1" dirty="0" smtClean="0"/>
-              <a:t>Summary</a:t>
+              <a:t>Content License Summary</a:t>
             </a:r>
           </a:p>
           <a:p>
@@ -4045,10 +3906,6 @@
             <a:br>
               <a:rPr lang="en-US" dirty="0"/>
             </a:br>
-            <a:r>
-              <a:rPr lang="en-US" dirty="0"/>
-              <a:t/>
-            </a:r>
             <a:br>
               <a:rPr lang="en-US" dirty="0"/>
             </a:br>
@@ -4072,11 +3929,7 @@
             </a:r>
             <a:r>
               <a:rPr lang="en-US" dirty="0"/>
-              <a:t>. Please keep in mind that only the full Content License is legally binding</a:t>
-            </a:r>
-            <a:r>
-              <a:rPr lang="en-US" dirty="0" smtClean="0"/>
-              <a:t>.</a:t>
+              <a:t>. Please keep in mind that only the full Content License is legally binding.</a:t>
             </a:r>
           </a:p>
           <a:p>
@@ -4389,7 +4242,7 @@
               </a:spcAft>
             </a:pPr>
             <a:r>
-              <a:rPr lang="en-US" sz="1300" b="1" dirty="0" smtClean="0">
+              <a:rPr lang="en-US" sz="1300" b="1" dirty="0">
                 <a:solidFill>
                   <a:srgbClr val="5E676E"/>
                 </a:solidFill>
@@ -4409,7 +4262,7 @@
               </a:spcAft>
             </a:pPr>
             <a:r>
-              <a:rPr lang="en-US" sz="1300" b="1" dirty="0" smtClean="0">
+              <a:rPr lang="en-US" sz="1300" b="1" dirty="0">
                 <a:solidFill>
                   <a:srgbClr val="5E676E"/>
                 </a:solidFill>
@@ -4418,13 +4271,6 @@
               </a:rPr>
               <a:t>model</a:t>
             </a:r>
-            <a:endParaRPr lang="en-US" sz="1300" b="1" dirty="0">
-              <a:solidFill>
-                <a:srgbClr val="5E676E"/>
-              </a:solidFill>
-              <a:latin typeface="Arial" panose="020B0604020202020204" pitchFamily="34" charset="0"/>
-              <a:cs typeface="Arial" panose="020B0604020202020204" pitchFamily="34" charset="0"/>
-            </a:endParaRPr>
           </a:p>
         </p:txBody>
       </p:sp>
@@ -4655,7 +4501,7 @@
               <a:defRPr/>
             </a:pPr>
             <a:r>
-              <a:rPr kumimoji="0" lang="en-US" sz="1300" b="1" i="0" u="none" strike="noStrike" kern="0" cap="none" spc="0" normalizeH="0" baseline="0" noProof="0" dirty="0" smtClean="0">
+              <a:rPr kumimoji="0" lang="en-US" sz="1300" b="1" i="0" u="none" strike="noStrike" kern="0" cap="none" spc="0" normalizeH="0" baseline="0" noProof="0" dirty="0">
                 <a:ln>
                   <a:noFill/>
                 </a:ln>
@@ -4672,7 +4518,7 @@
               <a:t>Binary </a:t>
             </a:r>
             <a:br>
-              <a:rPr kumimoji="0" lang="en-US" sz="1300" b="1" i="0" u="none" strike="noStrike" kern="0" cap="none" spc="0" normalizeH="0" baseline="0" noProof="0" dirty="0" smtClean="0">
+              <a:rPr kumimoji="0" lang="en-US" sz="1300" b="1" i="0" u="none" strike="noStrike" kern="0" cap="none" spc="0" normalizeH="0" baseline="0" noProof="0" dirty="0">
                 <a:ln>
                   <a:noFill/>
                 </a:ln>
@@ -4688,7 +4534,7 @@
               </a:rPr>
             </a:br>
             <a:r>
-              <a:rPr kumimoji="0" lang="en-US" sz="1300" b="1" i="0" u="none" strike="noStrike" kern="0" cap="none" spc="0" normalizeH="0" baseline="0" noProof="0" dirty="0" smtClean="0">
+              <a:rPr kumimoji="0" lang="en-US" sz="1300" b="1" i="0" u="none" strike="noStrike" kern="0" cap="none" spc="0" normalizeH="0" baseline="0" noProof="0" dirty="0">
                 <a:ln>
                   <a:noFill/>
                 </a:ln>
@@ -4704,20 +4550,6 @@
               </a:rPr>
               <a:t>Code*</a:t>
             </a:r>
-            <a:endParaRPr kumimoji="0" lang="en-US" sz="1300" b="1" i="0" u="none" strike="noStrike" kern="0" cap="none" spc="0" normalizeH="0" baseline="0" noProof="0" dirty="0">
-              <a:ln>
-                <a:noFill/>
-              </a:ln>
-              <a:solidFill>
-                <a:srgbClr val="FFFFFF"/>
-              </a:solidFill>
-              <a:effectLst/>
-              <a:uLnTx/>
-              <a:uFillTx/>
-              <a:latin typeface="Arial"/>
-              <a:ea typeface="+mn-ea"/>
-              <a:cs typeface="+mn-cs"/>
-            </a:endParaRPr>
           </a:p>
         </p:txBody>
       </p:sp>
@@ -4768,7 +4600,7 @@
               <a:defRPr/>
             </a:pPr>
             <a:r>
-              <a:rPr kumimoji="0" lang="en-US" sz="1300" b="1" i="0" u="none" strike="noStrike" kern="0" cap="none" spc="0" normalizeH="0" baseline="0" noProof="0" dirty="0" smtClean="0">
+              <a:rPr kumimoji="0" lang="en-US" sz="1300" b="1" i="0" u="none" strike="noStrike" kern="0" cap="none" spc="0" normalizeH="0" baseline="0" noProof="0" dirty="0">
                 <a:ln>
                   <a:noFill/>
                 </a:ln>
@@ -4785,7 +4617,7 @@
               <a:t>Production </a:t>
             </a:r>
             <a:br>
-              <a:rPr kumimoji="0" lang="en-US" sz="1300" b="1" i="0" u="none" strike="noStrike" kern="0" cap="none" spc="0" normalizeH="0" baseline="0" noProof="0" dirty="0" smtClean="0">
+              <a:rPr kumimoji="0" lang="en-US" sz="1300" b="1" i="0" u="none" strike="noStrike" kern="0" cap="none" spc="0" normalizeH="0" baseline="0" noProof="0" dirty="0">
                 <a:ln>
                   <a:noFill/>
                 </a:ln>
@@ -4801,7 +4633,7 @@
               </a:rPr>
             </a:br>
             <a:r>
-              <a:rPr kumimoji="0" lang="en-US" sz="1300" b="1" i="0" u="none" strike="noStrike" kern="0" cap="none" spc="0" normalizeH="0" baseline="0" noProof="0" dirty="0" smtClean="0">
+              <a:rPr kumimoji="0" lang="en-US" sz="1300" b="1" i="0" u="none" strike="noStrike" kern="0" cap="none" spc="0" normalizeH="0" baseline="0" noProof="0" dirty="0">
                 <a:ln>
                   <a:noFill/>
                 </a:ln>
@@ -4817,20 +4649,6 @@
               </a:rPr>
               <a:t>Code*</a:t>
             </a:r>
-            <a:endParaRPr kumimoji="0" lang="en-US" sz="1300" b="1" i="0" u="none" strike="noStrike" kern="0" cap="none" spc="0" normalizeH="0" baseline="0" noProof="0" dirty="0">
-              <a:ln>
-                <a:noFill/>
-              </a:ln>
-              <a:solidFill>
-                <a:srgbClr val="FFFFFF"/>
-              </a:solidFill>
-              <a:effectLst/>
-              <a:uLnTx/>
-              <a:uFillTx/>
-              <a:latin typeface="Arial"/>
-              <a:ea typeface="+mn-ea"/>
-              <a:cs typeface="+mn-cs"/>
-            </a:endParaRPr>
           </a:p>
         </p:txBody>
       </p:sp>
@@ -4881,7 +4699,7 @@
               <a:defRPr/>
             </a:pPr>
             <a:r>
-              <a:rPr kumimoji="0" lang="en-US" sz="1300" b="1" i="0" u="none" strike="noStrike" kern="0" cap="none" spc="0" normalizeH="0" baseline="0" noProof="0" dirty="0" smtClean="0">
+              <a:rPr kumimoji="0" lang="en-US" sz="1300" b="1" i="0" u="none" strike="noStrike" kern="0" cap="none" spc="0" normalizeH="0" baseline="0" noProof="0" dirty="0">
                 <a:ln>
                   <a:noFill/>
                 </a:ln>
@@ -4898,7 +4716,7 @@
               <a:t>Algorithm</a:t>
             </a:r>
             <a:br>
-              <a:rPr kumimoji="0" lang="en-US" sz="1300" b="1" i="0" u="none" strike="noStrike" kern="0" cap="none" spc="0" normalizeH="0" baseline="0" noProof="0" dirty="0" smtClean="0">
+              <a:rPr kumimoji="0" lang="en-US" sz="1300" b="1" i="0" u="none" strike="noStrike" kern="0" cap="none" spc="0" normalizeH="0" baseline="0" noProof="0" dirty="0">
                 <a:ln>
                   <a:noFill/>
                 </a:ln>
@@ -4914,7 +4732,7 @@
               </a:rPr>
             </a:br>
             <a:r>
-              <a:rPr kumimoji="0" lang="en-US" sz="1300" b="1" i="0" u="none" strike="noStrike" kern="0" cap="none" spc="0" normalizeH="0" baseline="0" noProof="0" dirty="0" smtClean="0">
+              <a:rPr kumimoji="0" lang="en-US" sz="1300" b="1" i="0" u="none" strike="noStrike" kern="0" cap="none" spc="0" normalizeH="0" baseline="0" noProof="0" dirty="0">
                 <a:ln>
                   <a:noFill/>
                 </a:ln>
@@ -4930,20 +4748,6 @@
               </a:rPr>
               <a:t>Code</a:t>
             </a:r>
-            <a:endParaRPr kumimoji="0" lang="en-US" sz="1300" b="1" i="0" u="none" strike="noStrike" kern="0" cap="none" spc="0" normalizeH="0" baseline="0" noProof="0" dirty="0">
-              <a:ln>
-                <a:noFill/>
-              </a:ln>
-              <a:solidFill>
-                <a:srgbClr val="FFFFFF"/>
-              </a:solidFill>
-              <a:effectLst/>
-              <a:uLnTx/>
-              <a:uFillTx/>
-              <a:latin typeface="Arial"/>
-              <a:ea typeface="+mn-ea"/>
-              <a:cs typeface="+mn-cs"/>
-            </a:endParaRPr>
           </a:p>
         </p:txBody>
       </p:sp>
@@ -4994,7 +4798,7 @@
               <a:defRPr/>
             </a:pPr>
             <a:r>
-              <a:rPr kumimoji="0" lang="en-US" sz="1300" b="1" i="0" u="none" strike="noStrike" kern="0" cap="none" spc="0" normalizeH="0" baseline="0" noProof="0" dirty="0" smtClean="0">
+              <a:rPr kumimoji="0" lang="en-US" sz="1300" b="1" i="0" u="none" strike="noStrike" kern="0" cap="none" spc="0" normalizeH="0" baseline="0" noProof="0" dirty="0">
                 <a:ln>
                   <a:noFill/>
                 </a:ln>
@@ -5011,7 +4815,7 @@
               <a:t>Behavioral </a:t>
             </a:r>
             <a:br>
-              <a:rPr kumimoji="0" lang="en-US" sz="1300" b="1" i="0" u="none" strike="noStrike" kern="0" cap="none" spc="0" normalizeH="0" baseline="0" noProof="0" dirty="0" smtClean="0">
+              <a:rPr kumimoji="0" lang="en-US" sz="1300" b="1" i="0" u="none" strike="noStrike" kern="0" cap="none" spc="0" normalizeH="0" baseline="0" noProof="0" dirty="0">
                 <a:ln>
                   <a:noFill/>
                 </a:ln>
@@ -5027,7 +4831,7 @@
               </a:rPr>
             </a:br>
             <a:r>
-              <a:rPr kumimoji="0" lang="en-US" sz="1300" b="1" i="0" u="none" strike="noStrike" kern="0" cap="none" spc="0" normalizeH="0" baseline="0" noProof="0" dirty="0" smtClean="0">
+              <a:rPr kumimoji="0" lang="en-US" sz="1300" b="1" i="0" u="none" strike="noStrike" kern="0" cap="none" spc="0" normalizeH="0" baseline="0" noProof="0" dirty="0">
                 <a:ln>
                   <a:noFill/>
                 </a:ln>
@@ -5043,20 +4847,6 @@
               </a:rPr>
               <a:t>Model*</a:t>
             </a:r>
-            <a:endParaRPr kumimoji="0" lang="en-US" sz="1300" b="1" i="0" u="none" strike="noStrike" kern="0" cap="none" spc="0" normalizeH="0" baseline="0" noProof="0" dirty="0">
-              <a:ln>
-                <a:noFill/>
-              </a:ln>
-              <a:solidFill>
-                <a:srgbClr val="FFFFFF"/>
-              </a:solidFill>
-              <a:effectLst/>
-              <a:uLnTx/>
-              <a:uFillTx/>
-              <a:latin typeface="Arial"/>
-              <a:ea typeface="+mn-ea"/>
-              <a:cs typeface="+mn-cs"/>
-            </a:endParaRPr>
           </a:p>
         </p:txBody>
       </p:sp>
@@ -5228,7 +5018,7 @@
               </a:spcAft>
             </a:pPr>
             <a:r>
-              <a:rPr lang="sv-SE" sz="1300" b="1" dirty="0" smtClean="0">
+              <a:rPr lang="sv-SE" sz="1300" b="1" dirty="0">
                 <a:solidFill>
                   <a:srgbClr val="5E676E"/>
                 </a:solidFill>
@@ -5308,7 +5098,7 @@
               </a:spcAft>
             </a:pPr>
             <a:r>
-              <a:rPr lang="en-US" sz="1300" b="1" dirty="0" err="1" smtClean="0">
+              <a:rPr lang="en-US" sz="1300" b="1" dirty="0" err="1">
                 <a:solidFill>
                   <a:srgbClr val="5E676E"/>
                 </a:solidFill>
@@ -5514,33 +5304,24 @@
           <a:lstStyle/>
           <a:p>
             <a:r>
-              <a:rPr lang="en-US" sz="2400" b="1" dirty="0" smtClean="0">
+              <a:rPr lang="en-US" sz="2400" b="1" dirty="0">
                 <a:solidFill>
                   <a:srgbClr val="00B050"/>
                 </a:solidFill>
               </a:rPr>
               <a:t>✔</a:t>
             </a:r>
-            <a:r>
-              <a:rPr lang="en-US" sz="2400" b="1" dirty="0" smtClean="0"/>
-              <a:t/>
-            </a:r>
             <a:br>
-              <a:rPr lang="en-US" sz="2400" b="1" dirty="0" smtClean="0"/>
+              <a:rPr lang="en-US" sz="2400" b="1" dirty="0"/>
             </a:br>
             <a:r>
-              <a:rPr lang="en-US" sz="2400" b="1" dirty="0" smtClean="0">
+              <a:rPr lang="en-US" sz="2400" b="1" dirty="0">
                 <a:solidFill>
                   <a:srgbClr val="FF0000"/>
                 </a:solidFill>
               </a:rPr>
               <a:t>✖</a:t>
             </a:r>
-            <a:endParaRPr lang="en-US" sz="2400" b="1" dirty="0">
-              <a:solidFill>
-                <a:srgbClr val="FF0000"/>
-              </a:solidFill>
-            </a:endParaRPr>
           </a:p>
         </p:txBody>
       </p:sp>
@@ -5597,7 +5378,7 @@
           <a:lstStyle/>
           <a:p>
             <a:r>
-              <a:rPr lang="en-US" sz="2400" b="1" dirty="0" smtClean="0">
+              <a:rPr lang="en-US" sz="2400" b="1" dirty="0">
                 <a:solidFill>
                   <a:srgbClr val="00B050"/>
                 </a:solidFill>
@@ -5622,21 +5403,6 @@
   <p:clrMapOvr>
     <a:masterClrMapping/>
   </p:clrMapOvr>
-  <mc:AlternateContent xmlns:mc="http://schemas.openxmlformats.org/markup-compatibility/2006" xmlns:p14="http://schemas.microsoft.com/office/powerpoint/2010/main">
-    <mc:Choice Requires="p14">
-      <p:transition spd="slow" p14:dur="2000"/>
-    </mc:Choice>
-    <mc:Fallback xmlns="">
-      <p:transition spd="slow"/>
-    </mc:Fallback>
-  </mc:AlternateContent>
-  <p:timing>
-    <p:tnLst>
-      <p:par>
-        <p:cTn id="1" dur="indefinite" restart="never" nodeType="tmRoot"/>
-      </p:par>
-    </p:tnLst>
-  </p:timing>
 </p:sld>
 </file>
 

</xml_diff>